<commit_message>
Updated theory slides and renamed applications for theory session
</commit_message>
<xml_diff>
--- a/man_slides_theory.pptx
+++ b/man_slides_theory.pptx
@@ -11,19 +11,19 @@
   <p:sldIdLst>
     <p:sldId id="342" r:id="rId3"/>
     <p:sldId id="366" r:id="rId4"/>
-    <p:sldId id="416" r:id="rId5"/>
-    <p:sldId id="403" r:id="rId6"/>
-    <p:sldId id="400" r:id="rId7"/>
-    <p:sldId id="415" r:id="rId8"/>
-    <p:sldId id="398" r:id="rId9"/>
-    <p:sldId id="401" r:id="rId10"/>
-    <p:sldId id="402" r:id="rId11"/>
-    <p:sldId id="397" r:id="rId12"/>
-    <p:sldId id="406" r:id="rId13"/>
-    <p:sldId id="407" r:id="rId14"/>
-    <p:sldId id="408" r:id="rId15"/>
-    <p:sldId id="409" r:id="rId16"/>
-    <p:sldId id="410" r:id="rId17"/>
+    <p:sldId id="403" r:id="rId5"/>
+    <p:sldId id="400" r:id="rId6"/>
+    <p:sldId id="415" r:id="rId7"/>
+    <p:sldId id="398" r:id="rId8"/>
+    <p:sldId id="401" r:id="rId9"/>
+    <p:sldId id="402" r:id="rId10"/>
+    <p:sldId id="397" r:id="rId11"/>
+    <p:sldId id="406" r:id="rId12"/>
+    <p:sldId id="407" r:id="rId13"/>
+    <p:sldId id="408" r:id="rId14"/>
+    <p:sldId id="409" r:id="rId15"/>
+    <p:sldId id="410" r:id="rId16"/>
+    <p:sldId id="416" r:id="rId17"/>
     <p:sldId id="413" r:id="rId18"/>
     <p:sldId id="412" r:id="rId19"/>
     <p:sldId id="414" r:id="rId20"/>
@@ -132,7 +132,6 @@
           <p14:sldIdLst>
             <p14:sldId id="342"/>
             <p14:sldId id="366"/>
-            <p14:sldId id="416"/>
             <p14:sldId id="403"/>
             <p14:sldId id="400"/>
             <p14:sldId id="415"/>
@@ -145,6 +144,7 @@
             <p14:sldId id="408"/>
             <p14:sldId id="409"/>
             <p14:sldId id="410"/>
+            <p14:sldId id="416"/>
             <p14:sldId id="413"/>
             <p14:sldId id="412"/>
             <p14:sldId id="414"/>
@@ -272,7 +272,7 @@
           <a:p>
             <a:fld id="{E82231CA-7AA9-4388-95A9-D2F3A0D02245}" type="datetimeFigureOut">
               <a:rPr lang="en-AU" smtClean="0"/>
-              <a:t>4/01/2017</a:t>
+              <a:t>15/01/2017</a:t>
             </a:fld>
             <a:endParaRPr lang="en-AU"/>
           </a:p>
@@ -899,7 +899,7 @@
           <a:p>
             <a:fld id="{6D85A15D-8EE9-4CFD-9B9F-EEE2D336B5D3}" type="slidenum">
               <a:rPr lang="en-AU" smtClean="0"/>
-              <a:t>11</a:t>
+              <a:t>10</a:t>
             </a:fld>
             <a:endParaRPr lang="en-AU"/>
           </a:p>
@@ -1068,7 +1068,7 @@
           <a:p>
             <a:fld id="{6D85A15D-8EE9-4CFD-9B9F-EEE2D336B5D3}" type="slidenum">
               <a:rPr lang="en-AU" smtClean="0"/>
-              <a:t>12</a:t>
+              <a:t>11</a:t>
             </a:fld>
             <a:endParaRPr lang="en-AU"/>
           </a:p>
@@ -1235,7 +1235,7 @@
           <a:p>
             <a:fld id="{6D85A15D-8EE9-4CFD-9B9F-EEE2D336B5D3}" type="slidenum">
               <a:rPr lang="en-AU" smtClean="0"/>
-              <a:t>13</a:t>
+              <a:t>12</a:t>
             </a:fld>
             <a:endParaRPr lang="en-AU"/>
           </a:p>
@@ -1407,7 +1407,7 @@
           <a:p>
             <a:fld id="{6D85A15D-8EE9-4CFD-9B9F-EEE2D336B5D3}" type="slidenum">
               <a:rPr lang="en-AU" smtClean="0"/>
-              <a:t>14</a:t>
+              <a:t>13</a:t>
             </a:fld>
             <a:endParaRPr lang="en-AU"/>
           </a:p>
@@ -1734,7 +1734,7 @@
           <a:p>
             <a:fld id="{6D85A15D-8EE9-4CFD-9B9F-EEE2D336B5D3}" type="slidenum">
               <a:rPr lang="en-AU" smtClean="0"/>
-              <a:t>15</a:t>
+              <a:t>14</a:t>
             </a:fld>
             <a:endParaRPr lang="en-AU"/>
           </a:p>
@@ -1780,7 +1780,12 @@
             <p:ph type="sldImg"/>
           </p:nvPr>
         </p:nvSpPr>
-        <p:spPr/>
+        <p:spPr>
+          <a:xfrm>
+            <a:off x="919163" y="746125"/>
+            <a:ext cx="4968875" cy="3725863"/>
+          </a:xfrm>
+        </p:spPr>
       </p:sp>
       <p:sp>
         <p:nvSpPr>
@@ -1797,15 +1802,7 @@
           <a:bodyPr/>
           <a:lstStyle/>
           <a:p>
-            <a:r>
-              <a:rPr lang="en-US" dirty="0" smtClean="0"/>
-              <a:t>S</a:t>
-            </a:r>
-            <a:r>
-              <a:rPr lang="en-US" baseline="0" dirty="0" smtClean="0"/>
-              <a:t>o why would a pharmacometrician want to use Shiny?</a:t>
-            </a:r>
-            <a:endParaRPr lang="en-US" dirty="0"/>
+            <a:endParaRPr lang="en-AU" sz="1200" b="1" dirty="0" smtClean="0"/>
           </a:p>
         </p:txBody>
       </p:sp>
@@ -1826,7 +1823,7 @@
           <a:p>
             <a:fld id="{6D85A15D-8EE9-4CFD-9B9F-EEE2D336B5D3}" type="slidenum">
               <a:rPr lang="en-AU" smtClean="0"/>
-              <a:t>16</a:t>
+              <a:t>15</a:t>
             </a:fld>
             <a:endParaRPr lang="en-AU"/>
           </a:p>
@@ -1835,7 +1832,7 @@
     </p:spTree>
     <p:extLst>
       <p:ext uri="{BB962C8B-B14F-4D97-AF65-F5344CB8AC3E}">
-        <p14:creationId xmlns:p14="http://schemas.microsoft.com/office/powerpoint/2010/main" val="1147280972"/>
+        <p14:creationId xmlns:p14="http://schemas.microsoft.com/office/powerpoint/2010/main" val="588493197"/>
       </p:ext>
     </p:extLst>
   </p:cSld>
@@ -1872,6 +1869,98 @@
             <p:ph type="sldImg"/>
           </p:nvPr>
         </p:nvSpPr>
+        <p:spPr/>
+      </p:sp>
+      <p:sp>
+        <p:nvSpPr>
+          <p:cNvPr id="3" name="Notes Placeholder 2"/>
+          <p:cNvSpPr>
+            <a:spLocks noGrp="1"/>
+          </p:cNvSpPr>
+          <p:nvPr>
+            <p:ph type="body" idx="1"/>
+          </p:nvPr>
+        </p:nvSpPr>
+        <p:spPr/>
+        <p:txBody>
+          <a:bodyPr/>
+          <a:lstStyle/>
+          <a:p>
+            <a:r>
+              <a:rPr lang="en-US" dirty="0" smtClean="0"/>
+              <a:t>S</a:t>
+            </a:r>
+            <a:r>
+              <a:rPr lang="en-US" baseline="0" dirty="0" smtClean="0"/>
+              <a:t>o why would a pharmacometrician want to use Shiny?</a:t>
+            </a:r>
+            <a:endParaRPr lang="en-US" dirty="0"/>
+          </a:p>
+        </p:txBody>
+      </p:sp>
+      <p:sp>
+        <p:nvSpPr>
+          <p:cNvPr id="4" name="Slide Number Placeholder 3"/>
+          <p:cNvSpPr>
+            <a:spLocks noGrp="1"/>
+          </p:cNvSpPr>
+          <p:nvPr>
+            <p:ph type="sldNum" sz="quarter" idx="10"/>
+          </p:nvPr>
+        </p:nvSpPr>
+        <p:spPr/>
+        <p:txBody>
+          <a:bodyPr/>
+          <a:lstStyle/>
+          <a:p>
+            <a:fld id="{6D85A15D-8EE9-4CFD-9B9F-EEE2D336B5D3}" type="slidenum">
+              <a:rPr lang="en-AU" smtClean="0"/>
+              <a:t>16</a:t>
+            </a:fld>
+            <a:endParaRPr lang="en-AU"/>
+          </a:p>
+        </p:txBody>
+      </p:sp>
+    </p:spTree>
+    <p:extLst>
+      <p:ext uri="{BB962C8B-B14F-4D97-AF65-F5344CB8AC3E}">
+        <p14:creationId xmlns:p14="http://schemas.microsoft.com/office/powerpoint/2010/main" val="1147280972"/>
+      </p:ext>
+    </p:extLst>
+  </p:cSld>
+  <p:clrMapOvr>
+    <a:masterClrMapping/>
+  </p:clrMapOvr>
+</p:notes>
+</file>
+
+<file path=ppt/notesSlides/notesSlide17.xml><?xml version="1.0" encoding="utf-8"?>
+<p:notes xmlns:a="http://schemas.openxmlformats.org/drawingml/2006/main" xmlns:r="http://schemas.openxmlformats.org/officeDocument/2006/relationships" xmlns:p="http://schemas.openxmlformats.org/presentationml/2006/main">
+  <p:cSld>
+    <p:spTree>
+      <p:nvGrpSpPr>
+        <p:cNvPr id="1" name=""/>
+        <p:cNvGrpSpPr/>
+        <p:nvPr/>
+      </p:nvGrpSpPr>
+      <p:grpSpPr>
+        <a:xfrm>
+          <a:off x="0" y="0"/>
+          <a:ext cx="0" cy="0"/>
+          <a:chOff x="0" y="0"/>
+          <a:chExt cx="0" cy="0"/>
+        </a:xfrm>
+      </p:grpSpPr>
+      <p:sp>
+        <p:nvSpPr>
+          <p:cNvPr id="2" name="Slide Image Placeholder 1"/>
+          <p:cNvSpPr>
+            <a:spLocks noGrp="1" noRot="1" noChangeAspect="1"/>
+          </p:cNvSpPr>
+          <p:nvPr>
+            <p:ph type="sldImg"/>
+          </p:nvPr>
+        </p:nvSpPr>
         <p:spPr>
           <a:xfrm>
             <a:off x="919163" y="746125"/>
@@ -1951,7 +2040,7 @@
 </p:notes>
 </file>
 
-<file path=ppt/notesSlides/notesSlide17.xml><?xml version="1.0" encoding="utf-8"?>
+<file path=ppt/notesSlides/notesSlide18.xml><?xml version="1.0" encoding="utf-8"?>
 <p:notes xmlns:a="http://schemas.openxmlformats.org/drawingml/2006/main" xmlns:r="http://schemas.openxmlformats.org/officeDocument/2006/relationships" xmlns:p="http://schemas.openxmlformats.org/presentationml/2006/main">
   <p:cSld>
     <p:spTree>
@@ -2450,7 +2539,7 @@
             <a:fld id="{86473A99-7306-4352-AD94-E81E29349191}" type="slidenum">
               <a:rPr lang="en-US" smtClean="0"/>
               <a:pPr/>
-              <a:t>4</a:t>
+              <a:t>3</a:t>
             </a:fld>
             <a:endParaRPr lang="en-US"/>
           </a:p>
@@ -2641,7 +2730,7 @@
           <a:p>
             <a:fld id="{6D85A15D-8EE9-4CFD-9B9F-EEE2D336B5D3}" type="slidenum">
               <a:rPr lang="en-AU" smtClean="0"/>
-              <a:t>5</a:t>
+              <a:t>4</a:t>
             </a:fld>
             <a:endParaRPr lang="en-AU"/>
           </a:p>
@@ -2758,7 +2847,7 @@
           <a:p>
             <a:fld id="{6D85A15D-8EE9-4CFD-9B9F-EEE2D336B5D3}" type="slidenum">
               <a:rPr lang="en-AU" smtClean="0"/>
-              <a:t>6</a:t>
+              <a:t>5</a:t>
             </a:fld>
             <a:endParaRPr lang="en-AU"/>
           </a:p>
@@ -2890,7 +2979,7 @@
           <a:p>
             <a:fld id="{6D85A15D-8EE9-4CFD-9B9F-EEE2D336B5D3}" type="slidenum">
               <a:rPr lang="en-AU" smtClean="0"/>
-              <a:t>7</a:t>
+              <a:t>6</a:t>
             </a:fld>
             <a:endParaRPr lang="en-AU"/>
           </a:p>
@@ -3137,7 +3226,7 @@
           <a:p>
             <a:fld id="{6D85A15D-8EE9-4CFD-9B9F-EEE2D336B5D3}" type="slidenum">
               <a:rPr lang="en-AU" smtClean="0"/>
-              <a:t>8</a:t>
+              <a:t>7</a:t>
             </a:fld>
             <a:endParaRPr lang="en-AU"/>
           </a:p>
@@ -3268,7 +3357,7 @@
           <a:p>
             <a:fld id="{6D85A15D-8EE9-4CFD-9B9F-EEE2D336B5D3}" type="slidenum">
               <a:rPr lang="en-AU" smtClean="0"/>
-              <a:t>9</a:t>
+              <a:t>8</a:t>
             </a:fld>
             <a:endParaRPr lang="en-AU"/>
           </a:p>
@@ -3420,7 +3509,7 @@
           <a:p>
             <a:fld id="{6D85A15D-8EE9-4CFD-9B9F-EEE2D336B5D3}" type="slidenum">
               <a:rPr lang="en-AU" smtClean="0"/>
-              <a:t>10</a:t>
+              <a:t>9</a:t>
             </a:fld>
             <a:endParaRPr lang="en-AU"/>
           </a:p>
@@ -4344,7 +4433,14 @@
   <p:clrMapOvr>
     <a:masterClrMapping/>
   </p:clrMapOvr>
-  <p:transition/>
+  <mc:AlternateContent xmlns:mc="http://schemas.openxmlformats.org/markup-compatibility/2006">
+    <mc:Choice xmlns:p14="http://schemas.microsoft.com/office/powerpoint/2010/main" Requires="p14">
+      <p:transition spd="slow" p14:dur="2000"/>
+    </mc:Choice>
+    <mc:Fallback>
+      <p:transition spd="slow"/>
+    </mc:Fallback>
+  </mc:AlternateContent>
   <p:timing>
     <p:tnLst>
       <p:par>
@@ -9386,7 +9482,18 @@
             <a:pPr eaLnBrk="1" hangingPunct="1"/>
             <a:r>
               <a:rPr lang="en-US" sz="3200" b="1" dirty="0" smtClean="0"/>
-              <a:t>Introduction to the Shiny Framework for Pharmacometrics</a:t>
+              <a:t>Introduction to the Shiny Framework for </a:t>
+            </a:r>
+            <a:r>
+              <a:rPr lang="en-US" sz="3200" b="1" dirty="0" smtClean="0"/>
+              <a:t>Pharmacometrics</a:t>
+            </a:r>
+            <a:br>
+              <a:rPr lang="en-US" sz="3200" b="1" dirty="0" smtClean="0"/>
+            </a:br>
+            <a:r>
+              <a:rPr lang="en-US" sz="3200" b="1" dirty="0" smtClean="0"/>
+              <a:t>Theory</a:t>
             </a:r>
             <a:r>
               <a:rPr lang="en-US" sz="3200" b="1" dirty="0"/>
@@ -9411,7 +9518,7 @@
         </p:nvSpPr>
         <p:spPr>
           <a:xfrm>
-            <a:off x="1403648" y="3115245"/>
+            <a:off x="1403648" y="3350920"/>
             <a:ext cx="7170600" cy="385763"/>
           </a:xfrm>
           <a:prstGeom prst="rect">
@@ -9446,7 +9553,7 @@
           <a:p>
             <a:r>
               <a:rPr lang="en-AU" sz="1600" dirty="0" smtClean="0"/>
-              <a:t>20</a:t>
+              <a:t>6</a:t>
             </a:r>
             <a:r>
               <a:rPr lang="en-AU" sz="1600" baseline="30000" dirty="0" smtClean="0"/>
@@ -9454,8 +9561,9 @@
             </a:r>
             <a:r>
               <a:rPr lang="en-AU" sz="1600" dirty="0" smtClean="0"/>
-              <a:t> May 2016</a:t>
-            </a:r>
+              <a:t> February 2017</a:t>
+            </a:r>
+            <a:endParaRPr lang="en-AU" sz="1600" dirty="0" smtClean="0"/>
           </a:p>
           <a:p>
             <a:endParaRPr lang="en-AU" sz="1600" dirty="0"/>
@@ -9740,271 +9848,9 @@
           <a:chExt cx="0" cy="0"/>
         </a:xfrm>
       </p:grpSpPr>
-      <p:sp>
-        <p:nvSpPr>
-          <p:cNvPr id="2" name="Text Placeholder 1"/>
-          <p:cNvSpPr>
-            <a:spLocks noGrp="1"/>
-          </p:cNvSpPr>
-          <p:nvPr>
-            <p:ph type="body" sz="quarter" idx="10"/>
-          </p:nvPr>
-        </p:nvSpPr>
-        <p:spPr/>
-        <p:txBody>
-          <a:bodyPr>
-            <a:normAutofit lnSpcReduction="10000"/>
-          </a:bodyPr>
-          <a:lstStyle/>
-          <a:p>
-            <a:r>
-              <a:rPr lang="en-AU" dirty="0" smtClean="0"/>
-              <a:t>ui.R: Displaying Reactive Output</a:t>
-            </a:r>
-            <a:endParaRPr lang="en-AU" dirty="0"/>
-          </a:p>
-        </p:txBody>
-      </p:sp>
-      <p:sp>
-        <p:nvSpPr>
-          <p:cNvPr id="4" name="TextBox 3"/>
-          <p:cNvSpPr txBox="1"/>
-          <p:nvPr/>
-        </p:nvSpPr>
-        <p:spPr>
-          <a:xfrm>
-            <a:off x="8532440" y="6309320"/>
-            <a:ext cx="517710" cy="369332"/>
-          </a:xfrm>
-          <a:prstGeom prst="rect">
-            <a:avLst/>
-          </a:prstGeom>
-          <a:noFill/>
-        </p:spPr>
-        <p:txBody>
-          <a:bodyPr wrap="square" rtlCol="0">
-            <a:spAutoFit/>
-          </a:bodyPr>
-          <a:lstStyle/>
-          <a:p>
-            <a:pPr algn="ctr"/>
-            <a:fld id="{A1ADA812-6D85-F54A-9708-1AEB03570AF0}" type="slidenum">
-              <a:rPr lang="en-US">
-                <a:solidFill>
-                  <a:schemeClr val="bg1"/>
-                </a:solidFill>
-                <a:latin typeface="Arial" charset="0"/>
-                <a:ea typeface="Arial" charset="0"/>
-                <a:cs typeface="Arial" charset="0"/>
-              </a:rPr>
-              <a:t>10</a:t>
-            </a:fld>
-            <a:endParaRPr lang="en-US" dirty="0">
-              <a:solidFill>
-                <a:schemeClr val="bg1"/>
-              </a:solidFill>
-              <a:latin typeface="Arial" charset="0"/>
-              <a:ea typeface="Arial" charset="0"/>
-              <a:cs typeface="Arial" charset="0"/>
-            </a:endParaRPr>
-          </a:p>
-        </p:txBody>
-      </p:sp>
-      <p:sp>
-        <p:nvSpPr>
-          <p:cNvPr id="3" name="Text Placeholder 2"/>
-          <p:cNvSpPr>
-            <a:spLocks noGrp="1"/>
-          </p:cNvSpPr>
-          <p:nvPr>
-            <p:ph type="body" sz="quarter" idx="11"/>
-          </p:nvPr>
-        </p:nvSpPr>
-        <p:spPr/>
-        <p:txBody>
-          <a:bodyPr/>
-          <a:lstStyle/>
-          <a:p>
-            <a:pPr>
-              <a:lnSpc>
-                <a:spcPct val="100000"/>
-              </a:lnSpc>
-            </a:pPr>
-            <a:r>
-              <a:rPr lang="en-AU" sz="2000" dirty="0"/>
-              <a:t>Output functions call R objects in </a:t>
-            </a:r>
-            <a:r>
-              <a:rPr lang="en-AU" sz="2000" dirty="0" err="1"/>
-              <a:t>server.R</a:t>
-            </a:r>
-            <a:r>
-              <a:rPr lang="en-AU" sz="2000" dirty="0"/>
-              <a:t> to the UI</a:t>
-            </a:r>
-          </a:p>
-          <a:p>
-            <a:pPr>
-              <a:lnSpc>
-                <a:spcPct val="100000"/>
-              </a:lnSpc>
-            </a:pPr>
-            <a:r>
-              <a:rPr lang="en-AU" sz="2000" dirty="0"/>
-              <a:t>Examples:</a:t>
-            </a:r>
-          </a:p>
-          <a:p>
-            <a:pPr lvl="1">
-              <a:lnSpc>
-                <a:spcPct val="100000"/>
-              </a:lnSpc>
-            </a:pPr>
-            <a:r>
-              <a:rPr lang="en-AU" sz="1800" dirty="0" err="1">
-                <a:latin typeface="Monaco" charset="0"/>
-                <a:ea typeface="Monaco" charset="0"/>
-                <a:cs typeface="Monaco" charset="0"/>
-              </a:rPr>
-              <a:t>plotOutput</a:t>
-            </a:r>
-            <a:endParaRPr lang="en-AU" sz="1800" dirty="0">
-              <a:latin typeface="Monaco" charset="0"/>
-              <a:ea typeface="Monaco" charset="0"/>
-              <a:cs typeface="Monaco" charset="0"/>
-            </a:endParaRPr>
-          </a:p>
-          <a:p>
-            <a:pPr lvl="1">
-              <a:lnSpc>
-                <a:spcPct val="100000"/>
-              </a:lnSpc>
-            </a:pPr>
-            <a:r>
-              <a:rPr lang="en-AU" sz="1800" dirty="0" err="1">
-                <a:latin typeface="Monaco" charset="0"/>
-                <a:ea typeface="Monaco" charset="0"/>
-                <a:cs typeface="Monaco" charset="0"/>
-              </a:rPr>
-              <a:t>tableOutput</a:t>
-            </a:r>
-            <a:endParaRPr lang="en-AU" sz="1800" dirty="0">
-              <a:latin typeface="Monaco" charset="0"/>
-              <a:ea typeface="Monaco" charset="0"/>
-              <a:cs typeface="Monaco" charset="0"/>
-            </a:endParaRPr>
-          </a:p>
-          <a:p>
-            <a:pPr lvl="1">
-              <a:lnSpc>
-                <a:spcPct val="100000"/>
-              </a:lnSpc>
-            </a:pPr>
-            <a:r>
-              <a:rPr lang="en-AU" sz="1800" dirty="0" err="1">
-                <a:latin typeface="Monaco" charset="0"/>
-                <a:ea typeface="Monaco" charset="0"/>
-                <a:cs typeface="Monaco" charset="0"/>
-              </a:rPr>
-              <a:t>textOutput</a:t>
-            </a:r>
-            <a:endParaRPr lang="en-AU" sz="1800" dirty="0">
-              <a:latin typeface="Monaco" charset="0"/>
-              <a:ea typeface="Monaco" charset="0"/>
-              <a:cs typeface="Monaco" charset="0"/>
-            </a:endParaRPr>
-          </a:p>
-          <a:p>
-            <a:pPr>
-              <a:lnSpc>
-                <a:spcPct val="100000"/>
-              </a:lnSpc>
-            </a:pPr>
-            <a:r>
-              <a:rPr lang="en-AU" sz="2000" dirty="0">
-                <a:cs typeface="Courier New" panose="02070309020205020404" pitchFamily="49" charset="0"/>
-              </a:rPr>
-              <a:t>Specific for the object in </a:t>
-            </a:r>
-            <a:r>
-              <a:rPr lang="en-AU" sz="2000" dirty="0" err="1">
-                <a:cs typeface="Courier New" panose="02070309020205020404" pitchFamily="49" charset="0"/>
-              </a:rPr>
-              <a:t>server.R</a:t>
-            </a:r>
-            <a:endParaRPr lang="en-AU" sz="2000" dirty="0">
-              <a:cs typeface="Courier New" panose="02070309020205020404" pitchFamily="49" charset="0"/>
-            </a:endParaRPr>
-          </a:p>
-          <a:p>
-            <a:pPr lvl="1">
-              <a:lnSpc>
-                <a:spcPct val="100000"/>
-              </a:lnSpc>
-            </a:pPr>
-            <a:r>
-              <a:rPr lang="en-AU" sz="1800" dirty="0">
-                <a:cs typeface="Courier New" panose="02070309020205020404" pitchFamily="49" charset="0"/>
-              </a:rPr>
-              <a:t>i.e. ggplot2 object called by </a:t>
-            </a:r>
-            <a:r>
-              <a:rPr lang="en-AU" sz="1800" dirty="0" err="1" smtClean="0">
-                <a:latin typeface="Monaco" charset="0"/>
-                <a:ea typeface="Monaco" charset="0"/>
-                <a:cs typeface="Monaco" charset="0"/>
-              </a:rPr>
-              <a:t>plotOutput</a:t>
-            </a:r>
-            <a:endParaRPr lang="en-AU" sz="1800" dirty="0">
-              <a:latin typeface="Monaco" charset="0"/>
-              <a:ea typeface="Monaco" charset="0"/>
-              <a:cs typeface="Monaco" charset="0"/>
-            </a:endParaRPr>
-          </a:p>
-        </p:txBody>
-      </p:sp>
-    </p:spTree>
-    <p:extLst>
-      <p:ext uri="{BB962C8B-B14F-4D97-AF65-F5344CB8AC3E}">
-        <p14:creationId xmlns:p14="http://schemas.microsoft.com/office/powerpoint/2010/main" val="330329931"/>
-      </p:ext>
-    </p:extLst>
-  </p:cSld>
-  <p:clrMapOvr>
-    <a:masterClrMapping/>
-  </p:clrMapOvr>
-  <p:transition/>
-  <p:timing>
-    <p:tnLst>
-      <p:par>
-        <p:cTn id="1" dur="indefinite" restart="never" nodeType="tmRoot"/>
-      </p:par>
-    </p:tnLst>
-  </p:timing>
-</p:sld>
-</file>
-
-<file path=ppt/slides/slide11.xml><?xml version="1.0" encoding="utf-8"?>
-<p:sld xmlns:a="http://schemas.openxmlformats.org/drawingml/2006/main" xmlns:r="http://schemas.openxmlformats.org/officeDocument/2006/relationships" xmlns:p="http://schemas.openxmlformats.org/presentationml/2006/main">
-  <p:cSld>
-    <p:spTree>
-      <p:nvGrpSpPr>
-        <p:cNvPr id="1" name=""/>
-        <p:cNvGrpSpPr/>
-        <p:nvPr/>
-      </p:nvGrpSpPr>
-      <p:grpSpPr>
-        <a:xfrm>
-          <a:off x="0" y="0"/>
-          <a:ext cx="0" cy="0"/>
-          <a:chOff x="0" y="0"/>
-          <a:chExt cx="0" cy="0"/>
-        </a:xfrm>
-      </p:grpSpPr>
       <p:pic>
         <p:nvPicPr>
-          <p:cNvPr id="2" name="Picture 1"/>
+          <p:cNvPr id="3" name="Picture 2"/>
           <p:cNvPicPr>
             <a:picLocks noChangeAspect="1"/>
           </p:cNvPicPr>
@@ -10018,24 +9864,17 @@
               </a:ext>
             </a:extLst>
           </a:blip>
-          <a:srcRect t="8025" r="45316" b="39722"/>
+          <a:srcRect l="825" t="958" r="1026" b="3927"/>
           <a:stretch/>
         </p:blipFill>
         <p:spPr>
           <a:xfrm>
-            <a:off x="138896" y="578727"/>
-            <a:ext cx="8876437" cy="5301205"/>
+            <a:off x="75414" y="1074656"/>
+            <a:ext cx="8974736" cy="4562573"/>
           </a:xfrm>
           <a:prstGeom prst="rect">
             <a:avLst/>
           </a:prstGeom>
-          <a:ln>
-            <a:solidFill>
-              <a:schemeClr val="bg1">
-                <a:lumMod val="50000"/>
-              </a:schemeClr>
-            </a:solidFill>
-          </a:ln>
         </p:spPr>
       </p:pic>
       <p:sp>
@@ -10067,7 +9906,7 @@
                 <a:ea typeface="Arial" charset="0"/>
                 <a:cs typeface="Arial" charset="0"/>
               </a:rPr>
-              <a:t>11</a:t>
+              <a:t>10</a:t>
             </a:fld>
             <a:endParaRPr lang="en-US" dirty="0">
               <a:latin typeface="Arial" charset="0"/>
@@ -10085,8 +9924,8 @@
         </p:nvSpPr>
         <p:spPr>
           <a:xfrm>
-            <a:off x="1259631" y="673434"/>
-            <a:ext cx="789087" cy="252533"/>
+            <a:off x="910840" y="1074657"/>
+            <a:ext cx="691718" cy="216816"/>
           </a:xfrm>
           <a:prstGeom prst="rect">
             <a:avLst/>
@@ -10159,6 +9998,213 @@
 </p:sld>
 </file>
 
+<file path=ppt/slides/slide11.xml><?xml version="1.0" encoding="utf-8"?>
+<p:sld xmlns:a="http://schemas.openxmlformats.org/drawingml/2006/main" xmlns:r="http://schemas.openxmlformats.org/officeDocument/2006/relationships" xmlns:p="http://schemas.openxmlformats.org/presentationml/2006/main">
+  <p:cSld>
+    <p:spTree>
+      <p:nvGrpSpPr>
+        <p:cNvPr id="1" name=""/>
+        <p:cNvGrpSpPr/>
+        <p:nvPr/>
+      </p:nvGrpSpPr>
+      <p:grpSpPr>
+        <a:xfrm>
+          <a:off x="0" y="0"/>
+          <a:ext cx="0" cy="0"/>
+          <a:chOff x="0" y="0"/>
+          <a:chExt cx="0" cy="0"/>
+        </a:xfrm>
+      </p:grpSpPr>
+      <p:sp>
+        <p:nvSpPr>
+          <p:cNvPr id="2" name="Text Placeholder 1"/>
+          <p:cNvSpPr>
+            <a:spLocks noGrp="1"/>
+          </p:cNvSpPr>
+          <p:nvPr>
+            <p:ph type="body" sz="quarter" idx="10"/>
+          </p:nvPr>
+        </p:nvSpPr>
+        <p:spPr/>
+        <p:txBody>
+          <a:bodyPr>
+            <a:normAutofit lnSpcReduction="10000"/>
+          </a:bodyPr>
+          <a:lstStyle/>
+          <a:p>
+            <a:r>
+              <a:rPr lang="en-AU" dirty="0" err="1" smtClean="0"/>
+              <a:t>server.R</a:t>
+            </a:r>
+            <a:r>
+              <a:rPr lang="en-AU" dirty="0" smtClean="0"/>
+              <a:t>: Application Instructions</a:t>
+            </a:r>
+            <a:endParaRPr lang="en-AU" dirty="0"/>
+          </a:p>
+        </p:txBody>
+      </p:sp>
+      <p:sp>
+        <p:nvSpPr>
+          <p:cNvPr id="4" name="TextBox 3"/>
+          <p:cNvSpPr txBox="1"/>
+          <p:nvPr/>
+        </p:nvSpPr>
+        <p:spPr>
+          <a:xfrm>
+            <a:off x="8532440" y="6309320"/>
+            <a:ext cx="517710" cy="369332"/>
+          </a:xfrm>
+          <a:prstGeom prst="rect">
+            <a:avLst/>
+          </a:prstGeom>
+          <a:noFill/>
+        </p:spPr>
+        <p:txBody>
+          <a:bodyPr wrap="square" rtlCol="0">
+            <a:spAutoFit/>
+          </a:bodyPr>
+          <a:lstStyle/>
+          <a:p>
+            <a:pPr algn="ctr"/>
+            <a:fld id="{A1ADA812-6D85-F54A-9708-1AEB03570AF0}" type="slidenum">
+              <a:rPr lang="en-US">
+                <a:solidFill>
+                  <a:schemeClr val="bg1"/>
+                </a:solidFill>
+                <a:latin typeface="Arial" charset="0"/>
+                <a:ea typeface="Arial" charset="0"/>
+                <a:cs typeface="Arial" charset="0"/>
+              </a:rPr>
+              <a:t>11</a:t>
+            </a:fld>
+            <a:endParaRPr lang="en-US" dirty="0">
+              <a:solidFill>
+                <a:schemeClr val="bg1"/>
+              </a:solidFill>
+              <a:latin typeface="Arial" charset="0"/>
+              <a:ea typeface="Arial" charset="0"/>
+              <a:cs typeface="Arial" charset="0"/>
+            </a:endParaRPr>
+          </a:p>
+        </p:txBody>
+      </p:sp>
+      <p:sp>
+        <p:nvSpPr>
+          <p:cNvPr id="7" name="Text Placeholder 2"/>
+          <p:cNvSpPr>
+            <a:spLocks noGrp="1"/>
+          </p:cNvSpPr>
+          <p:nvPr>
+            <p:ph type="body" sz="quarter" idx="11"/>
+          </p:nvPr>
+        </p:nvSpPr>
+        <p:spPr>
+          <a:xfrm>
+            <a:off x="409576" y="1059729"/>
+            <a:ext cx="8258175" cy="3429744"/>
+          </a:xfrm>
+        </p:spPr>
+        <p:txBody>
+          <a:bodyPr/>
+          <a:lstStyle/>
+          <a:p>
+            <a:pPr>
+              <a:lnSpc>
+                <a:spcPct val="100000"/>
+              </a:lnSpc>
+            </a:pPr>
+            <a:r>
+              <a:rPr lang="en-AU" sz="2000" dirty="0"/>
+              <a:t>Controls the processing of widget input to display output to the UI</a:t>
+            </a:r>
+          </a:p>
+          <a:p>
+            <a:pPr>
+              <a:lnSpc>
+                <a:spcPct val="100000"/>
+              </a:lnSpc>
+            </a:pPr>
+            <a:r>
+              <a:rPr lang="en-AU" sz="2000" dirty="0"/>
+              <a:t>Can use your favourite R packages and their functions</a:t>
+            </a:r>
+          </a:p>
+          <a:p>
+            <a:pPr>
+              <a:lnSpc>
+                <a:spcPct val="100000"/>
+              </a:lnSpc>
+            </a:pPr>
+            <a:r>
+              <a:rPr lang="en-AU" sz="2000" dirty="0" smtClean="0"/>
+              <a:t>Structure </a:t>
+            </a:r>
+            <a:r>
+              <a:rPr lang="en-AU" sz="2000" dirty="0"/>
+              <a:t>of </a:t>
+            </a:r>
+            <a:r>
+              <a:rPr lang="en-AU" sz="2000" dirty="0" err="1"/>
+              <a:t>server.R</a:t>
+            </a:r>
+            <a:r>
+              <a:rPr lang="en-AU" sz="2000" dirty="0"/>
+              <a:t> code plays an important role:</a:t>
+            </a:r>
+          </a:p>
+          <a:p>
+            <a:pPr lvl="1">
+              <a:lnSpc>
+                <a:spcPct val="100000"/>
+              </a:lnSpc>
+            </a:pPr>
+            <a:r>
+              <a:rPr lang="en-AU" dirty="0"/>
+              <a:t>Minimising redundant computation</a:t>
+            </a:r>
+          </a:p>
+          <a:p>
+            <a:pPr lvl="1">
+              <a:lnSpc>
+                <a:spcPct val="100000"/>
+              </a:lnSpc>
+            </a:pPr>
+            <a:r>
+              <a:rPr lang="en-AU" dirty="0"/>
+              <a:t>Maximising application speed</a:t>
+            </a:r>
+          </a:p>
+        </p:txBody>
+      </p:sp>
+    </p:spTree>
+    <p:extLst>
+      <p:ext uri="{BB962C8B-B14F-4D97-AF65-F5344CB8AC3E}">
+        <p14:creationId xmlns:p14="http://schemas.microsoft.com/office/powerpoint/2010/main" val="291091501"/>
+      </p:ext>
+    </p:extLst>
+  </p:cSld>
+  <p:clrMapOvr>
+    <a:masterClrMapping/>
+  </p:clrMapOvr>
+  <mc:AlternateContent xmlns:mc="http://schemas.openxmlformats.org/markup-compatibility/2006">
+    <mc:Choice xmlns:p14="http://schemas.microsoft.com/office/powerpoint/2010/main" Requires="p14">
+      <p:transition spd="slow" p14:dur="2000"/>
+    </mc:Choice>
+    <mc:Fallback>
+      <p:transition spd="slow"/>
+    </mc:Fallback>
+  </mc:AlternateContent>
+  <p:timing>
+    <p:tnLst>
+      <p:par>
+        <p:cTn id="1" dur="indefinite" restart="never" nodeType="tmRoot"/>
+      </p:par>
+    </p:tnLst>
+  </p:timing>
+</p:sld>
+</file>
+
 <file path=ppt/slides/slide12.xml><?xml version="1.0" encoding="utf-8"?>
 <p:sld xmlns:a="http://schemas.openxmlformats.org/drawingml/2006/main" xmlns:r="http://schemas.openxmlformats.org/officeDocument/2006/relationships" xmlns:p="http://schemas.openxmlformats.org/presentationml/2006/main">
   <p:cSld>
@@ -10199,7 +10245,7 @@
             </a:r>
             <a:r>
               <a:rPr lang="en-AU" dirty="0" smtClean="0"/>
-              <a:t>: Application Instructions</a:t>
+              <a:t>: Non-Reactive versus Reactive</a:t>
             </a:r>
             <a:endParaRPr lang="en-AU" dirty="0"/>
           </a:p>
@@ -10252,7 +10298,7 @@
       </p:sp>
       <p:sp>
         <p:nvSpPr>
-          <p:cNvPr id="7" name="Text Placeholder 2"/>
+          <p:cNvPr id="3" name="Text Placeholder 2"/>
           <p:cNvSpPr>
             <a:spLocks noGrp="1"/>
           </p:cNvSpPr>
@@ -10260,12 +10306,7 @@
             <p:ph type="body" sz="quarter" idx="11"/>
           </p:nvPr>
         </p:nvSpPr>
-        <p:spPr>
-          <a:xfrm>
-            <a:off x="414338" y="1295400"/>
-            <a:ext cx="8258175" cy="3429744"/>
-          </a:xfrm>
-        </p:spPr>
+        <p:spPr/>
         <p:txBody>
           <a:bodyPr/>
           <a:lstStyle/>
@@ -10277,7 +10318,40 @@
             </a:pPr>
             <a:r>
               <a:rPr lang="en-AU" sz="2000" dirty="0"/>
-              <a:t>Controls the processing of widget input to display output to the UI</a:t>
+              <a:t>“Non-reactive” objects include:</a:t>
+            </a:r>
+          </a:p>
+          <a:p>
+            <a:pPr lvl="1">
+              <a:lnSpc>
+                <a:spcPct val="100000"/>
+              </a:lnSpc>
+            </a:pPr>
+            <a:r>
+              <a:rPr lang="en-AU" sz="1800" dirty="0"/>
+              <a:t>Package libraries</a:t>
+            </a:r>
+          </a:p>
+          <a:p>
+            <a:pPr lvl="1">
+              <a:lnSpc>
+                <a:spcPct val="100000"/>
+              </a:lnSpc>
+            </a:pPr>
+            <a:r>
+              <a:rPr lang="en-AU" sz="1800" dirty="0"/>
+              <a:t>Constant expressions, i.e., time</a:t>
+            </a:r>
+          </a:p>
+          <a:p>
+            <a:pPr lvl="1">
+              <a:lnSpc>
+                <a:spcPct val="100000"/>
+              </a:lnSpc>
+            </a:pPr>
+            <a:r>
+              <a:rPr lang="en-AU" sz="1800" dirty="0"/>
+              <a:t>Loaded datasets</a:t>
             </a:r>
           </a:p>
           <a:p>
@@ -10288,7 +10362,7 @@
             </a:pPr>
             <a:r>
               <a:rPr lang="en-AU" sz="2000" dirty="0"/>
-              <a:t>Can use your favourite R packages and their functions</a:t>
+              <a:t>Objects dependent on widget input are “reactive”</a:t>
             </a:r>
           </a:p>
           <a:p>
@@ -10298,21 +10372,26 @@
               </a:lnSpc>
             </a:pPr>
             <a:r>
-              <a:rPr lang="en-AU" sz="2000" dirty="0" smtClean="0"/>
-              <a:t>Structure </a:t>
-            </a:r>
-            <a:r>
               <a:rPr lang="en-AU" sz="2000" dirty="0"/>
-              <a:t>of </a:t>
+              <a:t>Reactive objects need to be within the </a:t>
+            </a:r>
+            <a:r>
+              <a:rPr lang="en-AU" sz="2000" dirty="0">
+                <a:latin typeface="Monaco" charset="0"/>
+                <a:ea typeface="Monaco" charset="0"/>
+                <a:cs typeface="Monaco" charset="0"/>
+              </a:rPr>
+              <a:t>shinyServer</a:t>
+            </a:r>
+            <a:r>
+              <a:rPr lang="en-AU" sz="2000" dirty="0"/>
+              <a:t> function in </a:t>
             </a:r>
             <a:r>
               <a:rPr lang="en-AU" sz="2000" dirty="0" err="1"/>
               <a:t>server.R</a:t>
             </a:r>
-            <a:r>
-              <a:rPr lang="en-AU" sz="2000" dirty="0"/>
-              <a:t> code plays an important role:</a:t>
-            </a:r>
+            <a:endParaRPr lang="en-AU" sz="2000" dirty="0"/>
           </a:p>
           <a:p>
             <a:pPr lvl="1">
@@ -10321,9 +10400,61 @@
               </a:lnSpc>
             </a:pPr>
             <a:r>
-              <a:rPr lang="en-AU" dirty="0"/>
-              <a:t>Minimising redundant computation</a:t>
-            </a:r>
+              <a:rPr lang="en-AU" sz="1800" dirty="0"/>
+              <a:t>They are called from ui.R to </a:t>
+            </a:r>
+            <a:r>
+              <a:rPr lang="en-AU" sz="1800" dirty="0" err="1"/>
+              <a:t>server.R</a:t>
+            </a:r>
+            <a:r>
+              <a:rPr lang="en-AU" sz="1800" dirty="0"/>
+              <a:t> by the widget’s name:</a:t>
+            </a:r>
+          </a:p>
+          <a:p>
+            <a:pPr lvl="2"/>
+            <a:r>
+              <a:rPr lang="en-AU" sz="1600" dirty="0" smtClean="0">
+                <a:latin typeface="Monaco" charset="0"/>
+                <a:ea typeface="Monaco" charset="0"/>
+                <a:cs typeface="Monaco" charset="0"/>
+              </a:rPr>
+              <a:t>DOSE </a:t>
+            </a:r>
+            <a:r>
+              <a:rPr lang="en-AU" sz="1600" dirty="0" smtClean="0"/>
+              <a:t>in </a:t>
+            </a:r>
+            <a:r>
+              <a:rPr lang="en-AU" sz="1600" dirty="0"/>
+              <a:t>ui.R = </a:t>
+            </a:r>
+            <a:r>
+              <a:rPr lang="en-AU" sz="1600" dirty="0" err="1" smtClean="0">
+                <a:latin typeface="Monaco" charset="0"/>
+                <a:ea typeface="Monaco" charset="0"/>
+                <a:cs typeface="Monaco" charset="0"/>
+              </a:rPr>
+              <a:t>input$DOSE</a:t>
+            </a:r>
+            <a:r>
+              <a:rPr lang="en-AU" sz="1600" dirty="0" smtClean="0">
+                <a:latin typeface="Monaco" charset="0"/>
+                <a:ea typeface="Monaco" charset="0"/>
+                <a:cs typeface="Monaco" charset="0"/>
+              </a:rPr>
+              <a:t> </a:t>
+            </a:r>
+            <a:r>
+              <a:rPr lang="en-AU" sz="1600" dirty="0" smtClean="0"/>
+              <a:t>in </a:t>
+            </a:r>
+            <a:r>
+              <a:rPr lang="en-AU" sz="1600" dirty="0" err="1"/>
+              <a:t>server.R</a:t>
+            </a:r>
+            <a:endParaRPr lang="en-AU" sz="1600" dirty="0"/>
           </a:p>
           <a:p>
             <a:pPr lvl="1">
@@ -10332,23 +10463,79 @@
               </a:lnSpc>
             </a:pPr>
             <a:r>
-              <a:rPr lang="en-AU" dirty="0"/>
-              <a:t>Maximising application speed</a:t>
-            </a:r>
+              <a:rPr lang="en-AU" sz="1800" dirty="0"/>
+              <a:t>The value for the reactive object updates every time input from a widget changes</a:t>
+            </a:r>
+          </a:p>
+          <a:p>
+            <a:pPr lvl="1">
+              <a:lnSpc>
+                <a:spcPct val="100000"/>
+              </a:lnSpc>
+            </a:pPr>
+            <a:r>
+              <a:rPr lang="en-AU" sz="1800" dirty="0"/>
+              <a:t>Code in </a:t>
+            </a:r>
+            <a:r>
+              <a:rPr lang="en-AU" sz="1800" dirty="0">
+                <a:latin typeface="Monaco" charset="0"/>
+                <a:ea typeface="Monaco" charset="0"/>
+                <a:cs typeface="Monaco" charset="0"/>
+              </a:rPr>
+              <a:t>shinyServer</a:t>
+            </a:r>
+            <a:r>
+              <a:rPr lang="en-AU" sz="1800" dirty="0"/>
+              <a:t> re-executes with every widget change</a:t>
+            </a:r>
+          </a:p>
+          <a:p>
+            <a:pPr lvl="1">
+              <a:lnSpc>
+                <a:spcPct val="100000"/>
+              </a:lnSpc>
+            </a:pPr>
+            <a:r>
+              <a:rPr lang="en-AU" sz="1800" dirty="0"/>
+              <a:t>Code outside </a:t>
+            </a:r>
+            <a:r>
+              <a:rPr lang="en-AU" sz="1800" dirty="0">
+                <a:latin typeface="Monaco" charset="0"/>
+                <a:ea typeface="Monaco" charset="0"/>
+                <a:cs typeface="Monaco" charset="0"/>
+              </a:rPr>
+              <a:t>shinyServer</a:t>
+            </a:r>
+            <a:r>
+              <a:rPr lang="en-AU" sz="1800" dirty="0"/>
+              <a:t> is run once on application initiation</a:t>
+            </a:r>
+          </a:p>
+          <a:p>
+            <a:endParaRPr lang="en-US" dirty="0"/>
           </a:p>
         </p:txBody>
       </p:sp>
     </p:spTree>
     <p:extLst>
       <p:ext uri="{BB962C8B-B14F-4D97-AF65-F5344CB8AC3E}">
-        <p14:creationId xmlns:p14="http://schemas.microsoft.com/office/powerpoint/2010/main" val="291091501"/>
+        <p14:creationId xmlns:p14="http://schemas.microsoft.com/office/powerpoint/2010/main" val="1209133403"/>
       </p:ext>
     </p:extLst>
   </p:cSld>
   <p:clrMapOvr>
     <a:masterClrMapping/>
   </p:clrMapOvr>
-  <p:transition/>
+  <mc:AlternateContent xmlns:mc="http://schemas.openxmlformats.org/markup-compatibility/2006">
+    <mc:Choice xmlns:p14="http://schemas.microsoft.com/office/powerpoint/2010/main" Requires="p14">
+      <p:transition spd="slow" p14:dur="2000"/>
+    </mc:Choice>
+    <mc:Fallback>
+      <p:transition spd="slow"/>
+    </mc:Fallback>
+  </mc:AlternateContent>
   <p:timing>
     <p:tnLst>
       <p:par>
@@ -10399,7 +10586,7 @@
             </a:r>
             <a:r>
               <a:rPr lang="en-AU" dirty="0" smtClean="0"/>
-              <a:t>: Non-Reactive versus Reactive</a:t>
+              <a:t>: Sending Reactive Output to the UI</a:t>
             </a:r>
             <a:endParaRPr lang="en-AU" dirty="0"/>
           </a:p>
@@ -10472,7 +10659,7 @@
             </a:pPr>
             <a:r>
               <a:rPr lang="en-AU" sz="2000" dirty="0"/>
-              <a:t>“Non-reactive” objects include:</a:t>
+              <a:t>Functions that create reactive objects to be sent to ui.R</a:t>
             </a:r>
           </a:p>
           <a:p>
@@ -10482,9 +10669,18 @@
               </a:lnSpc>
             </a:pPr>
             <a:r>
-              <a:rPr lang="en-AU" sz="1800" dirty="0"/>
-              <a:t>Package libraries</a:t>
-            </a:r>
+              <a:rPr lang="en-AU" sz="1800" dirty="0" err="1">
+                <a:latin typeface="Monaco" charset="0"/>
+                <a:ea typeface="Monaco" charset="0"/>
+                <a:cs typeface="Monaco" charset="0"/>
+              </a:rPr>
+              <a:t>renderPlot</a:t>
+            </a:r>
+            <a:endParaRPr lang="en-AU" sz="1800" dirty="0">
+              <a:latin typeface="Monaco" charset="0"/>
+              <a:ea typeface="Monaco" charset="0"/>
+              <a:cs typeface="Monaco" charset="0"/>
+            </a:endParaRPr>
           </a:p>
           <a:p>
             <a:pPr lvl="1">
@@ -10493,9 +10689,18 @@
               </a:lnSpc>
             </a:pPr>
             <a:r>
-              <a:rPr lang="en-AU" sz="1800" dirty="0"/>
-              <a:t>Constant expressions, i.e., time</a:t>
-            </a:r>
+              <a:rPr lang="en-AU" sz="1800" dirty="0" err="1">
+                <a:latin typeface="Monaco" charset="0"/>
+                <a:ea typeface="Monaco" charset="0"/>
+                <a:cs typeface="Monaco" charset="0"/>
+              </a:rPr>
+              <a:t>renderTable</a:t>
+            </a:r>
+            <a:endParaRPr lang="en-AU" sz="1800" dirty="0">
+              <a:latin typeface="Monaco" charset="0"/>
+              <a:ea typeface="Monaco" charset="0"/>
+              <a:cs typeface="Monaco" charset="0"/>
+            </a:endParaRPr>
           </a:p>
           <a:p>
             <a:pPr lvl="1">
@@ -10504,9 +10709,18 @@
               </a:lnSpc>
             </a:pPr>
             <a:r>
-              <a:rPr lang="en-AU" sz="1800" dirty="0"/>
-              <a:t>Loaded datasets</a:t>
-            </a:r>
+              <a:rPr lang="en-AU" sz="1800" dirty="0" err="1">
+                <a:latin typeface="Monaco" charset="0"/>
+                <a:ea typeface="Monaco" charset="0"/>
+                <a:cs typeface="Monaco" charset="0"/>
+              </a:rPr>
+              <a:t>renderText</a:t>
+            </a:r>
+            <a:endParaRPr lang="en-AU" sz="1800" dirty="0">
+              <a:latin typeface="Monaco" charset="0"/>
+              <a:ea typeface="Monaco" charset="0"/>
+              <a:cs typeface="Monaco" charset="0"/>
+            </a:endParaRPr>
           </a:p>
           <a:p>
             <a:pPr>
@@ -10515,8 +10729,10 @@
               </a:lnSpc>
             </a:pPr>
             <a:r>
-              <a:rPr lang="en-AU" sz="2000" dirty="0"/>
-              <a:t>Objects dependent on widget input are “reactive”</a:t>
+              <a:rPr lang="en-AU" sz="2000" dirty="0">
+                <a:cs typeface="Courier New" panose="02070309020205020404" pitchFamily="49" charset="0"/>
+              </a:rPr>
+              <a:t>Can contain code for the reactive object and code processing widget input</a:t>
             </a:r>
           </a:p>
           <a:p>
@@ -10527,7 +10743,7 @@
             </a:pPr>
             <a:r>
               <a:rPr lang="en-AU" sz="2000" dirty="0"/>
-              <a:t>Reactive objects need to be within the </a:t>
+              <a:t>Code within </a:t>
             </a:r>
             <a:r>
               <a:rPr lang="en-AU" sz="2000" dirty="0">
@@ -10537,15 +10753,25 @@
               </a:rPr>
               <a:t>shinyServer</a:t>
             </a:r>
-            <a:r>
-              <a:rPr lang="en-AU" sz="2000" dirty="0"/>
-              <a:t> function in </a:t>
-            </a:r>
-            <a:r>
-              <a:rPr lang="en-AU" sz="2000" dirty="0" err="1"/>
-              <a:t>server.R</a:t>
-            </a:r>
-            <a:endParaRPr lang="en-AU" sz="2000" dirty="0"/>
+          </a:p>
+          <a:p>
+            <a:pPr>
+              <a:lnSpc>
+                <a:spcPct val="100000"/>
+              </a:lnSpc>
+            </a:pPr>
+            <a:r>
+              <a:rPr lang="en-AU" sz="2000" dirty="0">
+                <a:cs typeface="Courier New" panose="02070309020205020404" pitchFamily="49" charset="0"/>
+              </a:rPr>
+              <a:t>Specific for the object </a:t>
+            </a:r>
+            <a:r>
+              <a:rPr lang="en-AU" sz="2000" dirty="0" smtClean="0">
+                <a:cs typeface="Courier New" panose="02070309020205020404" pitchFamily="49" charset="0"/>
+              </a:rPr>
+              <a:t>type</a:t>
+            </a:r>
           </a:p>
           <a:p>
             <a:pPr lvl="1">
@@ -10554,46 +10780,71 @@
               </a:lnSpc>
             </a:pPr>
             <a:r>
+              <a:rPr lang="en-AU" sz="1800" dirty="0" smtClean="0">
+                <a:cs typeface="Courier New" panose="02070309020205020404" pitchFamily="49" charset="0"/>
+              </a:rPr>
+              <a:t>If </a:t>
+            </a:r>
+            <a:r>
               <a:rPr lang="en-AU" sz="1800" dirty="0"/>
-              <a:t>They are called from ui.R to </a:t>
-            </a:r>
-            <a:r>
-              <a:rPr lang="en-AU" sz="1800" dirty="0" err="1"/>
-              <a:t>server.R</a:t>
+              <a:t>ggplot2 object </a:t>
+            </a:r>
+            <a:r>
+              <a:rPr lang="en-AU" sz="1800" dirty="0" smtClean="0"/>
+              <a:t>is defined </a:t>
             </a:r>
             <a:r>
               <a:rPr lang="en-AU" sz="1800" dirty="0"/>
-              <a:t> by the widget’s name:</a:t>
-            </a:r>
-          </a:p>
-          <a:p>
-            <a:pPr lvl="2"/>
-            <a:r>
-              <a:rPr lang="en-AU" sz="1600" dirty="0" smtClean="0">
+              <a:t>within </a:t>
+            </a:r>
+            <a:r>
+              <a:rPr lang="en-AU" sz="1800" dirty="0" err="1">
                 <a:latin typeface="Monaco" charset="0"/>
                 <a:ea typeface="Monaco" charset="0"/>
                 <a:cs typeface="Monaco" charset="0"/>
               </a:rPr>
-              <a:t>DOSE </a:t>
-            </a:r>
-            <a:r>
-              <a:rPr lang="en-AU" sz="1600" dirty="0" smtClean="0"/>
-              <a:t>in </a:t>
-            </a:r>
-            <a:r>
-              <a:rPr lang="en-AU" sz="1600" dirty="0"/>
-              <a:t>ui.R = </a:t>
-            </a:r>
-            <a:r>
-              <a:rPr lang="en-AU" sz="1600" dirty="0" err="1" smtClean="0">
+              <a:t>plotOutput</a:t>
+            </a:r>
+            <a:r>
+              <a:rPr lang="en-AU" sz="1800" dirty="0"/>
+              <a:t> in </a:t>
+            </a:r>
+            <a:r>
+              <a:rPr lang="en-AU" sz="1800" dirty="0" smtClean="0"/>
+              <a:t>ui.R</a:t>
+            </a:r>
+            <a:endParaRPr lang="en-AU" sz="1800" dirty="0">
+              <a:cs typeface="Courier New" panose="02070309020205020404" pitchFamily="49" charset="0"/>
+            </a:endParaRPr>
+          </a:p>
+          <a:p>
+            <a:pPr lvl="1">
+              <a:lnSpc>
+                <a:spcPct val="100000"/>
+              </a:lnSpc>
+            </a:pPr>
+            <a:r>
+              <a:rPr lang="en-AU" sz="1800" dirty="0" smtClean="0">
+                <a:cs typeface="Courier New" panose="02070309020205020404" pitchFamily="49" charset="0"/>
+              </a:rPr>
+              <a:t>Then defined </a:t>
+            </a:r>
+            <a:r>
+              <a:rPr lang="en-AU" sz="1800" dirty="0">
+                <a:cs typeface="Courier New" panose="02070309020205020404" pitchFamily="49" charset="0"/>
+              </a:rPr>
+              <a:t>within </a:t>
+            </a:r>
+            <a:r>
+              <a:rPr lang="en-AU" sz="1800" dirty="0" err="1" smtClean="0">
                 <a:latin typeface="Monaco" charset="0"/>
                 <a:ea typeface="Monaco" charset="0"/>
                 <a:cs typeface="Monaco" charset="0"/>
               </a:rPr>
-              <a:t>input$DOSE</a:t>
-            </a:r>
-            <a:r>
-              <a:rPr lang="en-AU" sz="1600" dirty="0" smtClean="0">
+              <a:t>renderPlot</a:t>
+            </a:r>
+            <a:r>
+              <a:rPr lang="en-AU" sz="1800" dirty="0">
                 <a:latin typeface="Monaco" charset="0"/>
                 <a:ea typeface="Monaco" charset="0"/>
                 <a:cs typeface="Monaco" charset="0"/>
@@ -10601,88 +10852,35 @@
               <a:t> </a:t>
             </a:r>
             <a:r>
-              <a:rPr lang="en-AU" sz="1600" dirty="0" smtClean="0"/>
+              <a:rPr lang="en-AU" sz="1800" dirty="0" smtClean="0"/>
               <a:t>in </a:t>
             </a:r>
             <a:r>
-              <a:rPr lang="en-AU" sz="1600" dirty="0" err="1"/>
+              <a:rPr lang="en-AU" sz="1800" dirty="0" err="1" smtClean="0"/>
               <a:t>server.R</a:t>
             </a:r>
-            <a:endParaRPr lang="en-AU" sz="1600" dirty="0"/>
-          </a:p>
-          <a:p>
-            <a:pPr lvl="1">
-              <a:lnSpc>
-                <a:spcPct val="100000"/>
-              </a:lnSpc>
-            </a:pPr>
-            <a:r>
-              <a:rPr lang="en-AU" sz="1800" dirty="0"/>
-              <a:t>The value for the reactive object updates every time input from a widget changes</a:t>
-            </a:r>
-          </a:p>
-          <a:p>
-            <a:pPr lvl="1">
-              <a:lnSpc>
-                <a:spcPct val="100000"/>
-              </a:lnSpc>
-            </a:pPr>
-            <a:r>
-              <a:rPr lang="en-AU" sz="1800" dirty="0"/>
-              <a:t>Code in </a:t>
-            </a:r>
-            <a:r>
-              <a:rPr lang="en-AU" sz="1800" dirty="0">
-                <a:latin typeface="Monaco" charset="0"/>
-                <a:ea typeface="Monaco" charset="0"/>
-                <a:cs typeface="Monaco" charset="0"/>
-              </a:rPr>
-              <a:t>shinyServer</a:t>
-            </a:r>
-            <a:r>
-              <a:rPr lang="en-AU" sz="1800" dirty="0"/>
-              <a:t> re-executes with every widget change</a:t>
-            </a:r>
-          </a:p>
-          <a:p>
-            <a:pPr lvl="1">
-              <a:lnSpc>
-                <a:spcPct val="100000"/>
-              </a:lnSpc>
-            </a:pPr>
-            <a:r>
-              <a:rPr lang="en-AU" sz="1800" dirty="0"/>
-              <a:t>Code outside </a:t>
-            </a:r>
-            <a:r>
-              <a:rPr lang="en-AU" sz="1800" dirty="0">
-                <a:latin typeface="Monaco" charset="0"/>
-                <a:ea typeface="Monaco" charset="0"/>
-                <a:cs typeface="Monaco" charset="0"/>
-              </a:rPr>
-              <a:t>shinyServer</a:t>
-            </a:r>
-            <a:r>
-              <a:rPr lang="en-AU" sz="1800" dirty="0"/>
-              <a:t> is run once on application initiation</a:t>
-            </a:r>
-          </a:p>
-          <a:p>
-            <a:endParaRPr lang="en-US" dirty="0"/>
+            <a:endParaRPr lang="en-AU" sz="1800" dirty="0"/>
           </a:p>
         </p:txBody>
       </p:sp>
     </p:spTree>
     <p:extLst>
       <p:ext uri="{BB962C8B-B14F-4D97-AF65-F5344CB8AC3E}">
-        <p14:creationId xmlns:p14="http://schemas.microsoft.com/office/powerpoint/2010/main" val="1209133403"/>
+        <p14:creationId xmlns:p14="http://schemas.microsoft.com/office/powerpoint/2010/main" val="910563920"/>
       </p:ext>
     </p:extLst>
   </p:cSld>
   <p:clrMapOvr>
     <a:masterClrMapping/>
   </p:clrMapOvr>
-  <p:transition/>
+  <mc:AlternateContent xmlns:mc="http://schemas.openxmlformats.org/markup-compatibility/2006">
+    <mc:Choice xmlns:p14="http://schemas.microsoft.com/office/powerpoint/2010/main" Requires="p14">
+      <p:transition spd="slow" p14:dur="2000"/>
+    </mc:Choice>
+    <mc:Fallback>
+      <p:transition spd="slow"/>
+    </mc:Fallback>
+  </mc:AlternateContent>
   <p:timing>
     <p:tnLst>
       <p:par>
@@ -10710,347 +10908,9 @@
           <a:chExt cx="0" cy="0"/>
         </a:xfrm>
       </p:grpSpPr>
-      <p:sp>
-        <p:nvSpPr>
-          <p:cNvPr id="2" name="Text Placeholder 1"/>
-          <p:cNvSpPr>
-            <a:spLocks noGrp="1"/>
-          </p:cNvSpPr>
-          <p:nvPr>
-            <p:ph type="body" sz="quarter" idx="10"/>
-          </p:nvPr>
-        </p:nvSpPr>
-        <p:spPr/>
-        <p:txBody>
-          <a:bodyPr>
-            <a:normAutofit lnSpcReduction="10000"/>
-          </a:bodyPr>
-          <a:lstStyle/>
-          <a:p>
-            <a:r>
-              <a:rPr lang="en-AU" dirty="0" err="1" smtClean="0"/>
-              <a:t>server.R</a:t>
-            </a:r>
-            <a:r>
-              <a:rPr lang="en-AU" dirty="0" smtClean="0"/>
-              <a:t>: Sending Reactive Output to the UI</a:t>
-            </a:r>
-            <a:endParaRPr lang="en-AU" dirty="0"/>
-          </a:p>
-        </p:txBody>
-      </p:sp>
-      <p:sp>
-        <p:nvSpPr>
-          <p:cNvPr id="4" name="TextBox 3"/>
-          <p:cNvSpPr txBox="1"/>
-          <p:nvPr/>
-        </p:nvSpPr>
-        <p:spPr>
-          <a:xfrm>
-            <a:off x="8532440" y="6309320"/>
-            <a:ext cx="517710" cy="369332"/>
-          </a:xfrm>
-          <a:prstGeom prst="rect">
-            <a:avLst/>
-          </a:prstGeom>
-          <a:noFill/>
-        </p:spPr>
-        <p:txBody>
-          <a:bodyPr wrap="square" rtlCol="0">
-            <a:spAutoFit/>
-          </a:bodyPr>
-          <a:lstStyle/>
-          <a:p>
-            <a:pPr algn="ctr"/>
-            <a:fld id="{A1ADA812-6D85-F54A-9708-1AEB03570AF0}" type="slidenum">
-              <a:rPr lang="en-US">
-                <a:solidFill>
-                  <a:schemeClr val="bg1"/>
-                </a:solidFill>
-                <a:latin typeface="Arial" charset="0"/>
-                <a:ea typeface="Arial" charset="0"/>
-                <a:cs typeface="Arial" charset="0"/>
-              </a:rPr>
-              <a:t>14</a:t>
-            </a:fld>
-            <a:endParaRPr lang="en-US" dirty="0">
-              <a:solidFill>
-                <a:schemeClr val="bg1"/>
-              </a:solidFill>
-              <a:latin typeface="Arial" charset="0"/>
-              <a:ea typeface="Arial" charset="0"/>
-              <a:cs typeface="Arial" charset="0"/>
-            </a:endParaRPr>
-          </a:p>
-        </p:txBody>
-      </p:sp>
-      <p:sp>
-        <p:nvSpPr>
-          <p:cNvPr id="3" name="Text Placeholder 2"/>
-          <p:cNvSpPr>
-            <a:spLocks noGrp="1"/>
-          </p:cNvSpPr>
-          <p:nvPr>
-            <p:ph type="body" sz="quarter" idx="11"/>
-          </p:nvPr>
-        </p:nvSpPr>
-        <p:spPr/>
-        <p:txBody>
-          <a:bodyPr/>
-          <a:lstStyle/>
-          <a:p>
-            <a:pPr>
-              <a:lnSpc>
-                <a:spcPct val="100000"/>
-              </a:lnSpc>
-            </a:pPr>
-            <a:r>
-              <a:rPr lang="en-AU" sz="2000" dirty="0"/>
-              <a:t>Functions that create reactive objects to be sent to ui.R</a:t>
-            </a:r>
-          </a:p>
-          <a:p>
-            <a:pPr lvl="1">
-              <a:lnSpc>
-                <a:spcPct val="100000"/>
-              </a:lnSpc>
-            </a:pPr>
-            <a:r>
-              <a:rPr lang="en-AU" sz="1800" dirty="0" err="1">
-                <a:latin typeface="Monaco" charset="0"/>
-                <a:ea typeface="Monaco" charset="0"/>
-                <a:cs typeface="Monaco" charset="0"/>
-              </a:rPr>
-              <a:t>renderPlot</a:t>
-            </a:r>
-            <a:endParaRPr lang="en-AU" sz="1800" dirty="0">
-              <a:latin typeface="Monaco" charset="0"/>
-              <a:ea typeface="Monaco" charset="0"/>
-              <a:cs typeface="Monaco" charset="0"/>
-            </a:endParaRPr>
-          </a:p>
-          <a:p>
-            <a:pPr lvl="1">
-              <a:lnSpc>
-                <a:spcPct val="100000"/>
-              </a:lnSpc>
-            </a:pPr>
-            <a:r>
-              <a:rPr lang="en-AU" sz="1800" dirty="0" err="1">
-                <a:latin typeface="Monaco" charset="0"/>
-                <a:ea typeface="Monaco" charset="0"/>
-                <a:cs typeface="Monaco" charset="0"/>
-              </a:rPr>
-              <a:t>renderTable</a:t>
-            </a:r>
-            <a:endParaRPr lang="en-AU" sz="1800" dirty="0">
-              <a:latin typeface="Monaco" charset="0"/>
-              <a:ea typeface="Monaco" charset="0"/>
-              <a:cs typeface="Monaco" charset="0"/>
-            </a:endParaRPr>
-          </a:p>
-          <a:p>
-            <a:pPr lvl="1">
-              <a:lnSpc>
-                <a:spcPct val="100000"/>
-              </a:lnSpc>
-            </a:pPr>
-            <a:r>
-              <a:rPr lang="en-AU" sz="1800" dirty="0" err="1">
-                <a:latin typeface="Monaco" charset="0"/>
-                <a:ea typeface="Monaco" charset="0"/>
-                <a:cs typeface="Monaco" charset="0"/>
-              </a:rPr>
-              <a:t>renderText</a:t>
-            </a:r>
-            <a:endParaRPr lang="en-AU" sz="1800" dirty="0">
-              <a:latin typeface="Monaco" charset="0"/>
-              <a:ea typeface="Monaco" charset="0"/>
-              <a:cs typeface="Monaco" charset="0"/>
-            </a:endParaRPr>
-          </a:p>
-          <a:p>
-            <a:pPr>
-              <a:lnSpc>
-                <a:spcPct val="100000"/>
-              </a:lnSpc>
-            </a:pPr>
-            <a:r>
-              <a:rPr lang="en-AU" sz="2000" dirty="0">
-                <a:cs typeface="Courier New" panose="02070309020205020404" pitchFamily="49" charset="0"/>
-              </a:rPr>
-              <a:t>Can contain code for the reactive object and code processing widget input</a:t>
-            </a:r>
-          </a:p>
-          <a:p>
-            <a:pPr>
-              <a:lnSpc>
-                <a:spcPct val="100000"/>
-              </a:lnSpc>
-            </a:pPr>
-            <a:r>
-              <a:rPr lang="en-AU" sz="2000" dirty="0"/>
-              <a:t>Code within </a:t>
-            </a:r>
-            <a:r>
-              <a:rPr lang="en-AU" sz="2000" dirty="0">
-                <a:latin typeface="Monaco" charset="0"/>
-                <a:ea typeface="Monaco" charset="0"/>
-                <a:cs typeface="Monaco" charset="0"/>
-              </a:rPr>
-              <a:t>shinyServer</a:t>
-            </a:r>
-          </a:p>
-          <a:p>
-            <a:pPr>
-              <a:lnSpc>
-                <a:spcPct val="100000"/>
-              </a:lnSpc>
-            </a:pPr>
-            <a:r>
-              <a:rPr lang="en-AU" sz="2000" dirty="0">
-                <a:cs typeface="Courier New" panose="02070309020205020404" pitchFamily="49" charset="0"/>
-              </a:rPr>
-              <a:t>Specific for the object </a:t>
-            </a:r>
-            <a:r>
-              <a:rPr lang="en-AU" sz="2000" dirty="0" smtClean="0">
-                <a:cs typeface="Courier New" panose="02070309020205020404" pitchFamily="49" charset="0"/>
-              </a:rPr>
-              <a:t>type</a:t>
-            </a:r>
-          </a:p>
-          <a:p>
-            <a:pPr lvl="1">
-              <a:lnSpc>
-                <a:spcPct val="100000"/>
-              </a:lnSpc>
-            </a:pPr>
-            <a:r>
-              <a:rPr lang="en-AU" sz="1800" dirty="0" smtClean="0">
-                <a:cs typeface="Courier New" panose="02070309020205020404" pitchFamily="49" charset="0"/>
-              </a:rPr>
-              <a:t>If </a:t>
-            </a:r>
-            <a:r>
-              <a:rPr lang="en-AU" sz="1800" dirty="0"/>
-              <a:t>ggplot2 object </a:t>
-            </a:r>
-            <a:r>
-              <a:rPr lang="en-AU" sz="1800" dirty="0" smtClean="0"/>
-              <a:t>is defined </a:t>
-            </a:r>
-            <a:r>
-              <a:rPr lang="en-AU" sz="1800" dirty="0"/>
-              <a:t>within </a:t>
-            </a:r>
-            <a:r>
-              <a:rPr lang="en-AU" sz="1800" dirty="0" err="1">
-                <a:latin typeface="Monaco" charset="0"/>
-                <a:ea typeface="Monaco" charset="0"/>
-                <a:cs typeface="Monaco" charset="0"/>
-              </a:rPr>
-              <a:t>plotOutput</a:t>
-            </a:r>
-            <a:r>
-              <a:rPr lang="en-AU" sz="1800" dirty="0"/>
-              <a:t> in </a:t>
-            </a:r>
-            <a:r>
-              <a:rPr lang="en-AU" sz="1800" dirty="0" smtClean="0"/>
-              <a:t>ui.R</a:t>
-            </a:r>
-            <a:endParaRPr lang="en-AU" sz="1800" dirty="0">
-              <a:cs typeface="Courier New" panose="02070309020205020404" pitchFamily="49" charset="0"/>
-            </a:endParaRPr>
-          </a:p>
-          <a:p>
-            <a:pPr lvl="1">
-              <a:lnSpc>
-                <a:spcPct val="100000"/>
-              </a:lnSpc>
-            </a:pPr>
-            <a:r>
-              <a:rPr lang="en-AU" sz="1800" dirty="0" smtClean="0">
-                <a:cs typeface="Courier New" panose="02070309020205020404" pitchFamily="49" charset="0"/>
-              </a:rPr>
-              <a:t>Then defined </a:t>
-            </a:r>
-            <a:r>
-              <a:rPr lang="en-AU" sz="1800" dirty="0">
-                <a:cs typeface="Courier New" panose="02070309020205020404" pitchFamily="49" charset="0"/>
-              </a:rPr>
-              <a:t>within </a:t>
-            </a:r>
-            <a:r>
-              <a:rPr lang="en-AU" sz="1800" dirty="0" err="1" smtClean="0">
-                <a:latin typeface="Monaco" charset="0"/>
-                <a:ea typeface="Monaco" charset="0"/>
-                <a:cs typeface="Monaco" charset="0"/>
-              </a:rPr>
-              <a:t>renderPlot</a:t>
-            </a:r>
-            <a:r>
-              <a:rPr lang="en-AU" sz="1800" dirty="0">
-                <a:latin typeface="Monaco" charset="0"/>
-                <a:ea typeface="Monaco" charset="0"/>
-                <a:cs typeface="Monaco" charset="0"/>
-              </a:rPr>
-              <a:t> </a:t>
-            </a:r>
-            <a:r>
-              <a:rPr lang="en-AU" sz="1800" dirty="0" smtClean="0"/>
-              <a:t>in </a:t>
-            </a:r>
-            <a:r>
-              <a:rPr lang="en-AU" sz="1800" dirty="0" err="1" smtClean="0"/>
-              <a:t>server.R</a:t>
-            </a:r>
-            <a:endParaRPr lang="en-AU" sz="1800" dirty="0"/>
-          </a:p>
-        </p:txBody>
-      </p:sp>
-    </p:spTree>
-    <p:extLst>
-      <p:ext uri="{BB962C8B-B14F-4D97-AF65-F5344CB8AC3E}">
-        <p14:creationId xmlns:p14="http://schemas.microsoft.com/office/powerpoint/2010/main" val="910563920"/>
-      </p:ext>
-    </p:extLst>
-  </p:cSld>
-  <p:clrMapOvr>
-    <a:masterClrMapping/>
-  </p:clrMapOvr>
-  <p:transition/>
-  <p:timing>
-    <p:tnLst>
-      <p:par>
-        <p:cTn id="1" dur="indefinite" restart="never" nodeType="tmRoot"/>
-      </p:par>
-    </p:tnLst>
-  </p:timing>
-</p:sld>
-</file>
-
-<file path=ppt/slides/slide15.xml><?xml version="1.0" encoding="utf-8"?>
-<p:sld xmlns:a="http://schemas.openxmlformats.org/drawingml/2006/main" xmlns:r="http://schemas.openxmlformats.org/officeDocument/2006/relationships" xmlns:p="http://schemas.openxmlformats.org/presentationml/2006/main">
-  <p:cSld>
-    <p:spTree>
-      <p:nvGrpSpPr>
-        <p:cNvPr id="1" name=""/>
-        <p:cNvGrpSpPr/>
-        <p:nvPr/>
-      </p:nvGrpSpPr>
-      <p:grpSpPr>
-        <a:xfrm>
-          <a:off x="0" y="0"/>
-          <a:ext cx="0" cy="0"/>
-          <a:chOff x="0" y="0"/>
-          <a:chExt cx="0" cy="0"/>
-        </a:xfrm>
-      </p:grpSpPr>
       <p:pic>
         <p:nvPicPr>
-          <p:cNvPr id="2" name="Picture 1"/>
+          <p:cNvPr id="3" name="Picture 2"/>
           <p:cNvPicPr>
             <a:picLocks noChangeAspect="1"/>
           </p:cNvPicPr>
@@ -11064,23 +10924,19 @@
               </a:ext>
             </a:extLst>
           </a:blip>
-          <a:srcRect t="8080" r="45300" b="17443"/>
+          <a:srcRect l="1207" t="1236" r="1244" b="3440"/>
           <a:stretch/>
         </p:blipFill>
         <p:spPr>
           <a:xfrm>
-            <a:off x="172516" y="315380"/>
-            <a:ext cx="7314370" cy="6224316"/>
+            <a:off x="147850" y="141402"/>
+            <a:ext cx="8004027" cy="6537250"/>
           </a:xfrm>
           <a:prstGeom prst="rect">
             <a:avLst/>
           </a:prstGeom>
           <a:ln>
-            <a:solidFill>
-              <a:schemeClr val="bg1">
-                <a:lumMod val="50000"/>
-              </a:schemeClr>
-            </a:solidFill>
+            <a:noFill/>
           </a:ln>
         </p:spPr>
       </p:pic>
@@ -11113,7 +10969,7 @@
                 <a:ea typeface="Arial" charset="0"/>
                 <a:cs typeface="Arial" charset="0"/>
               </a:rPr>
-              <a:t>15</a:t>
+              <a:t>14</a:t>
             </a:fld>
             <a:endParaRPr lang="en-US" dirty="0">
               <a:latin typeface="Arial" charset="0"/>
@@ -11131,7 +10987,7 @@
         </p:nvSpPr>
         <p:spPr>
           <a:xfrm>
-            <a:off x="7252008" y="721650"/>
+            <a:off x="7791837" y="756743"/>
             <a:ext cx="360040" cy="1990318"/>
           </a:xfrm>
           <a:prstGeom prst="rightBrace">
@@ -11177,7 +11033,7 @@
         </p:nvSpPr>
         <p:spPr>
           <a:xfrm>
-            <a:off x="7252008" y="2747062"/>
+            <a:off x="7792992" y="2747061"/>
             <a:ext cx="360040" cy="3665313"/>
           </a:xfrm>
           <a:prstGeom prst="rightBrace">
@@ -11223,8 +11079,8 @@
         </p:nvSpPr>
         <p:spPr>
           <a:xfrm>
-            <a:off x="7555253" y="1549690"/>
-            <a:ext cx="1646605" cy="369332"/>
+            <a:off x="7995085" y="1521410"/>
+            <a:ext cx="1070273" cy="646331"/>
           </a:xfrm>
           <a:prstGeom prst="rect">
             <a:avLst/>
@@ -11232,11 +11088,12 @@
           <a:noFill/>
         </p:spPr>
         <p:txBody>
-          <a:bodyPr wrap="none" rtlCol="0">
+          <a:bodyPr wrap="square" rtlCol="0">
             <a:spAutoFit/>
           </a:bodyPr>
           <a:lstStyle/>
           <a:p>
+            <a:pPr algn="ctr"/>
             <a:r>
               <a:rPr lang="en-US" dirty="0" smtClean="0">
                 <a:latin typeface="Arial" charset="0"/>
@@ -11261,7 +11118,7 @@
         </p:nvSpPr>
         <p:spPr>
           <a:xfrm>
-            <a:off x="7629667" y="4433373"/>
+            <a:off x="8013939" y="4395052"/>
             <a:ext cx="1236236" cy="369332"/>
           </a:xfrm>
           <a:prstGeom prst="rect">
@@ -11299,7 +11156,7 @@
         </p:nvSpPr>
         <p:spPr>
           <a:xfrm>
-            <a:off x="792957" y="315380"/>
+            <a:off x="150159" y="141402"/>
             <a:ext cx="723327" cy="176630"/>
           </a:xfrm>
           <a:prstGeom prst="rect">
@@ -11373,6 +11230,295 @@
 </p:sld>
 </file>
 
+<file path=ppt/slides/slide15.xml><?xml version="1.0" encoding="utf-8"?>
+<p:sld xmlns:a="http://schemas.openxmlformats.org/drawingml/2006/main" xmlns:r="http://schemas.openxmlformats.org/officeDocument/2006/relationships" xmlns:p="http://schemas.openxmlformats.org/presentationml/2006/main">
+  <p:cSld>
+    <p:spTree>
+      <p:nvGrpSpPr>
+        <p:cNvPr id="1" name=""/>
+        <p:cNvGrpSpPr/>
+        <p:nvPr/>
+      </p:nvGrpSpPr>
+      <p:grpSpPr>
+        <a:xfrm>
+          <a:off x="0" y="0"/>
+          <a:ext cx="0" cy="0"/>
+          <a:chOff x="0" y="0"/>
+          <a:chExt cx="0" cy="0"/>
+        </a:xfrm>
+      </p:grpSpPr>
+      <p:sp>
+        <p:nvSpPr>
+          <p:cNvPr id="2" name="Text Placeholder 1"/>
+          <p:cNvSpPr>
+            <a:spLocks noGrp="1"/>
+          </p:cNvSpPr>
+          <p:nvPr>
+            <p:ph type="body" sz="quarter" idx="10"/>
+          </p:nvPr>
+        </p:nvSpPr>
+        <p:spPr/>
+        <p:txBody>
+          <a:bodyPr>
+            <a:normAutofit lnSpcReduction="10000"/>
+          </a:bodyPr>
+          <a:lstStyle/>
+          <a:p>
+            <a:r>
+              <a:rPr lang="en-AU" dirty="0" smtClean="0"/>
+              <a:t>Demonstration: Adding/Changing Widgets</a:t>
+            </a:r>
+            <a:endParaRPr lang="en-AU" dirty="0"/>
+          </a:p>
+        </p:txBody>
+      </p:sp>
+      <p:sp>
+        <p:nvSpPr>
+          <p:cNvPr id="4" name="TextBox 3"/>
+          <p:cNvSpPr txBox="1"/>
+          <p:nvPr/>
+        </p:nvSpPr>
+        <p:spPr>
+          <a:xfrm>
+            <a:off x="8532440" y="6309320"/>
+            <a:ext cx="517710" cy="369332"/>
+          </a:xfrm>
+          <a:prstGeom prst="rect">
+            <a:avLst/>
+          </a:prstGeom>
+          <a:noFill/>
+        </p:spPr>
+        <p:txBody>
+          <a:bodyPr wrap="square" rtlCol="0">
+            <a:spAutoFit/>
+          </a:bodyPr>
+          <a:lstStyle/>
+          <a:p>
+            <a:pPr algn="ctr"/>
+            <a:fld id="{A1ADA812-6D85-F54A-9708-1AEB03570AF0}" type="slidenum">
+              <a:rPr lang="en-US">
+                <a:solidFill>
+                  <a:schemeClr val="bg1"/>
+                </a:solidFill>
+                <a:latin typeface="Arial" charset="0"/>
+                <a:ea typeface="Arial" charset="0"/>
+                <a:cs typeface="Arial" charset="0"/>
+              </a:rPr>
+              <a:t>15</a:t>
+            </a:fld>
+            <a:endParaRPr lang="en-US" dirty="0">
+              <a:solidFill>
+                <a:schemeClr val="bg1"/>
+              </a:solidFill>
+              <a:latin typeface="Arial" charset="0"/>
+              <a:ea typeface="Arial" charset="0"/>
+              <a:cs typeface="Arial" charset="0"/>
+            </a:endParaRPr>
+          </a:p>
+        </p:txBody>
+      </p:sp>
+      <p:sp>
+        <p:nvSpPr>
+          <p:cNvPr id="3" name="Text Placeholder 2"/>
+          <p:cNvSpPr>
+            <a:spLocks noGrp="1"/>
+          </p:cNvSpPr>
+          <p:nvPr>
+            <p:ph type="body" sz="quarter" idx="11"/>
+          </p:nvPr>
+        </p:nvSpPr>
+        <p:spPr/>
+        <p:txBody>
+          <a:bodyPr/>
+          <a:lstStyle/>
+          <a:p>
+            <a:pPr marL="457200" indent="-457200">
+              <a:lnSpc>
+                <a:spcPct val="100000"/>
+              </a:lnSpc>
+              <a:buFont typeface="+mj-lt"/>
+              <a:buAutoNum type="arabicPeriod"/>
+            </a:pPr>
+            <a:r>
+              <a:rPr lang="en-AU" sz="2000" dirty="0" smtClean="0"/>
+              <a:t>Change </a:t>
+            </a:r>
+            <a:r>
+              <a:rPr lang="en-AU" sz="1800" dirty="0" err="1" smtClean="0">
+                <a:latin typeface="Monaco" charset="0"/>
+                <a:ea typeface="Monaco" charset="0"/>
+                <a:cs typeface="Monaco" charset="0"/>
+              </a:rPr>
+              <a:t>sliderInput</a:t>
+            </a:r>
+            <a:r>
+              <a:rPr lang="en-AU" sz="1800" dirty="0" smtClean="0"/>
+              <a:t> </a:t>
+            </a:r>
+            <a:r>
+              <a:rPr lang="en-AU" sz="2000" dirty="0" smtClean="0"/>
+              <a:t>for </a:t>
+            </a:r>
+            <a:r>
+              <a:rPr lang="en-AU" sz="1800" dirty="0" smtClean="0">
+                <a:latin typeface="Monaco" charset="0"/>
+                <a:ea typeface="Monaco" charset="0"/>
+                <a:cs typeface="Monaco" charset="0"/>
+              </a:rPr>
+              <a:t>DOSE</a:t>
+            </a:r>
+            <a:r>
+              <a:rPr lang="en-AU" sz="1800" dirty="0" smtClean="0"/>
+              <a:t> </a:t>
+            </a:r>
+            <a:r>
+              <a:rPr lang="en-AU" sz="2000" dirty="0" smtClean="0"/>
+              <a:t>to </a:t>
+            </a:r>
+            <a:r>
+              <a:rPr lang="en-AU" sz="1800" dirty="0" err="1" smtClean="0">
+                <a:latin typeface="Monaco" charset="0"/>
+                <a:ea typeface="Monaco" charset="0"/>
+                <a:cs typeface="Monaco" charset="0"/>
+              </a:rPr>
+              <a:t>selectInput</a:t>
+            </a:r>
+            <a:endParaRPr lang="en-AU" sz="1800" dirty="0" smtClean="0">
+              <a:latin typeface="Monaco" charset="0"/>
+              <a:ea typeface="Monaco" charset="0"/>
+              <a:cs typeface="Monaco" charset="0"/>
+            </a:endParaRPr>
+          </a:p>
+          <a:p>
+            <a:pPr marL="857250" lvl="1" indent="-457200">
+              <a:lnSpc>
+                <a:spcPct val="100000"/>
+              </a:lnSpc>
+            </a:pPr>
+            <a:r>
+              <a:rPr lang="en-AU" sz="1800" dirty="0" smtClean="0"/>
+              <a:t>Only choices are 50 and 100 mg</a:t>
+            </a:r>
+            <a:endParaRPr lang="en-AU" sz="1800" dirty="0" smtClean="0"/>
+          </a:p>
+          <a:p>
+            <a:pPr marL="457200" indent="-457200">
+              <a:lnSpc>
+                <a:spcPct val="100000"/>
+              </a:lnSpc>
+              <a:buFont typeface="+mj-lt"/>
+              <a:buAutoNum type="arabicPeriod"/>
+            </a:pPr>
+            <a:r>
+              <a:rPr lang="en-AU" sz="2000" dirty="0" smtClean="0"/>
+              <a:t>Add </a:t>
+            </a:r>
+            <a:r>
+              <a:rPr lang="en-AU" sz="1800" dirty="0" err="1" smtClean="0">
+                <a:latin typeface="Monaco" charset="0"/>
+                <a:ea typeface="Monaco" charset="0"/>
+                <a:cs typeface="Monaco" charset="0"/>
+              </a:rPr>
+              <a:t>sliderInput</a:t>
+            </a:r>
+            <a:r>
+              <a:rPr lang="en-AU" sz="1800" dirty="0" smtClean="0"/>
+              <a:t> </a:t>
+            </a:r>
+            <a:r>
+              <a:rPr lang="en-AU" sz="2000" dirty="0" smtClean="0"/>
+              <a:t>for weight (WT)</a:t>
+            </a:r>
+          </a:p>
+          <a:p>
+            <a:pPr marL="457200" indent="-457200">
+              <a:lnSpc>
+                <a:spcPct val="100000"/>
+              </a:lnSpc>
+              <a:buFont typeface="+mj-lt"/>
+              <a:buAutoNum type="arabicPeriod"/>
+            </a:pPr>
+            <a:r>
+              <a:rPr lang="en-AU" sz="2000" dirty="0" smtClean="0"/>
+              <a:t>Add </a:t>
+            </a:r>
+            <a:r>
+              <a:rPr lang="en-AU" sz="1800" dirty="0" err="1" smtClean="0">
+                <a:latin typeface="Monaco" charset="0"/>
+                <a:ea typeface="Monaco" charset="0"/>
+                <a:cs typeface="Monaco" charset="0"/>
+              </a:rPr>
+              <a:t>numericInput</a:t>
+            </a:r>
+            <a:r>
+              <a:rPr lang="en-AU" sz="1800" dirty="0" smtClean="0"/>
+              <a:t> </a:t>
+            </a:r>
+            <a:r>
+              <a:rPr lang="en-AU" sz="2000" dirty="0" smtClean="0"/>
+              <a:t>for creatinine clearance (CRCL)</a:t>
+            </a:r>
+          </a:p>
+          <a:p>
+            <a:pPr marL="457200" indent="-457200">
+              <a:lnSpc>
+                <a:spcPct val="100000"/>
+              </a:lnSpc>
+              <a:buFont typeface="+mj-lt"/>
+              <a:buAutoNum type="arabicPeriod"/>
+            </a:pPr>
+            <a:r>
+              <a:rPr lang="en-AU" sz="2000" dirty="0" smtClean="0"/>
+              <a:t>Add </a:t>
+            </a:r>
+            <a:r>
+              <a:rPr lang="en-AU" sz="1800" dirty="0" err="1" smtClean="0">
+                <a:latin typeface="Monaco" charset="0"/>
+                <a:ea typeface="Monaco" charset="0"/>
+                <a:cs typeface="Monaco" charset="0"/>
+              </a:rPr>
+              <a:t>checkboxInput</a:t>
+            </a:r>
+            <a:r>
+              <a:rPr lang="en-AU" sz="1800" dirty="0" smtClean="0"/>
+              <a:t> </a:t>
+            </a:r>
+            <a:r>
+              <a:rPr lang="en-AU" sz="2000" dirty="0" smtClean="0"/>
+              <a:t>to plot concentrations on a log-scale</a:t>
+            </a:r>
+            <a:endParaRPr lang="en-AU" sz="2000" dirty="0"/>
+          </a:p>
+        </p:txBody>
+      </p:sp>
+    </p:spTree>
+    <p:extLst>
+      <p:ext uri="{BB962C8B-B14F-4D97-AF65-F5344CB8AC3E}">
+        <p14:creationId xmlns:p14="http://schemas.microsoft.com/office/powerpoint/2010/main" val="651422629"/>
+      </p:ext>
+    </p:extLst>
+  </p:cSld>
+  <p:clrMapOvr>
+    <a:masterClrMapping/>
+  </p:clrMapOvr>
+  <mc:AlternateContent xmlns:mc="http://schemas.openxmlformats.org/markup-compatibility/2006">
+    <mc:Choice xmlns:p14="http://schemas.microsoft.com/office/powerpoint/2010/main" Requires="p14">
+      <p:transition spd="slow" p14:dur="2000"/>
+    </mc:Choice>
+    <mc:Fallback>
+      <p:transition spd="slow"/>
+    </mc:Fallback>
+  </mc:AlternateContent>
+  <p:timing>
+    <p:tnLst>
+      <p:par>
+        <p:cTn id="1" dur="indefinite" restart="never" nodeType="tmRoot"/>
+      </p:par>
+    </p:tnLst>
+  </p:timing>
+</p:sld>
+</file>
+
 <file path=ppt/slides/slide16.xml><?xml version="1.0" encoding="utf-8"?>
 <p:sld xmlns:a="http://schemas.openxmlformats.org/drawingml/2006/main" xmlns:r="http://schemas.openxmlformats.org/officeDocument/2006/relationships" xmlns:p="http://schemas.openxmlformats.org/presentationml/2006/main">
   <p:cSld>
@@ -11642,7 +11788,14 @@
   <p:clrMapOvr>
     <a:masterClrMapping/>
   </p:clrMapOvr>
-  <p:transition/>
+  <mc:AlternateContent xmlns:mc="http://schemas.openxmlformats.org/markup-compatibility/2006">
+    <mc:Choice xmlns:p14="http://schemas.microsoft.com/office/powerpoint/2010/main" Requires="p14">
+      <p:transition spd="slow" p14:dur="2000"/>
+    </mc:Choice>
+    <mc:Fallback>
+      <p:transition spd="slow"/>
+    </mc:Fallback>
+  </mc:AlternateContent>
   <p:timing>
     <p:tnLst>
       <p:par>
@@ -11909,7 +12062,14 @@
   <p:clrMapOvr>
     <a:masterClrMapping/>
   </p:clrMapOvr>
-  <p:transition/>
+  <mc:AlternateContent xmlns:mc="http://schemas.openxmlformats.org/markup-compatibility/2006">
+    <mc:Choice xmlns:p14="http://schemas.microsoft.com/office/powerpoint/2010/main" Requires="p14">
+      <p:transition spd="slow" p14:dur="2000"/>
+    </mc:Choice>
+    <mc:Fallback>
+      <p:transition spd="slow"/>
+    </mc:Fallback>
+  </mc:AlternateContent>
   <p:timing>
     <p:tnLst>
       <p:par>
@@ -12103,6 +12263,73 @@
             </a:r>
             <a:endParaRPr lang="en-US" sz="1800" dirty="0" smtClean="0"/>
           </a:p>
+          <a:p>
+            <a:pPr>
+              <a:lnSpc>
+                <a:spcPct val="100000"/>
+              </a:lnSpc>
+            </a:pPr>
+            <a:r>
+              <a:rPr lang="en-US" sz="2000" dirty="0" err="1" smtClean="0"/>
+              <a:t>ISoP</a:t>
+            </a:r>
+            <a:r>
+              <a:rPr lang="en-US" sz="2000" dirty="0" smtClean="0"/>
+              <a:t> Study Group – Introduction to the Shiny Framework</a:t>
+            </a:r>
+          </a:p>
+          <a:p>
+            <a:pPr lvl="1">
+              <a:lnSpc>
+                <a:spcPct val="100000"/>
+              </a:lnSpc>
+            </a:pPr>
+            <a:r>
+              <a:rPr lang="en-US" sz="1800" dirty="0"/>
+              <a:t>Available online: </a:t>
+            </a:r>
+            <a:r>
+              <a:rPr lang="en-US" sz="1800" dirty="0">
+                <a:hlinkClick r:id="rId4"/>
+              </a:rPr>
+              <a:t>https://</a:t>
+            </a:r>
+            <a:r>
+              <a:rPr lang="en-US" sz="1800" dirty="0" smtClean="0">
+                <a:hlinkClick r:id="rId4"/>
+              </a:rPr>
+              <a:t>github.com/isop-phmx/studyGroup/issues/19</a:t>
+            </a:r>
+            <a:r>
+              <a:rPr lang="en-US" sz="1800" dirty="0"/>
+              <a:t> and </a:t>
+            </a:r>
+            <a:r>
+              <a:rPr lang="en-US" sz="1800" dirty="0">
+                <a:hlinkClick r:id="rId5"/>
+              </a:rPr>
+              <a:t>https://</a:t>
+            </a:r>
+            <a:r>
+              <a:rPr lang="en-US" sz="1800" dirty="0" smtClean="0">
+                <a:hlinkClick r:id="rId5"/>
+              </a:rPr>
+              <a:t>www.youtube.com/watch?v=z_G77KtLAuY</a:t>
+            </a:r>
+            <a:r>
+              <a:rPr lang="en-US" sz="1800" dirty="0" smtClean="0"/>
+              <a:t> </a:t>
+            </a:r>
+            <a:endParaRPr lang="en-US" sz="1800" dirty="0"/>
+          </a:p>
+          <a:p>
+            <a:pPr lvl="1">
+              <a:lnSpc>
+                <a:spcPct val="100000"/>
+              </a:lnSpc>
+            </a:pPr>
+            <a:endParaRPr lang="en-US" sz="1800" dirty="0" smtClean="0"/>
+          </a:p>
         </p:txBody>
       </p:sp>
     </p:spTree>
@@ -12115,7 +12342,14 @@
   <p:clrMapOvr>
     <a:masterClrMapping/>
   </p:clrMapOvr>
-  <p:transition/>
+  <mc:AlternateContent xmlns:mc="http://schemas.openxmlformats.org/markup-compatibility/2006">
+    <mc:Choice xmlns:p14="http://schemas.microsoft.com/office/powerpoint/2010/main" Requires="p14">
+      <p:transition spd="slow" p14:dur="2000"/>
+    </mc:Choice>
+    <mc:Fallback>
+      <p:transition spd="slow"/>
+    </mc:Fallback>
+  </mc:AlternateContent>
   <p:timing>
     <p:tnLst>
       <p:par>
@@ -12237,39 +12471,12 @@
             </a:pPr>
             <a:r>
               <a:rPr lang="en-AU" dirty="0" smtClean="0"/>
-              <a:t>Demonstration of example Shiny applications</a:t>
-            </a:r>
-          </a:p>
-          <a:p>
-            <a:pPr marL="742950" lvl="2" indent="-342900"/>
+              <a:t>Demonstration of example Shiny </a:t>
+            </a:r>
             <a:r>
               <a:rPr lang="en-AU" dirty="0" smtClean="0"/>
-              <a:t>Example scripts for the second application are posted on GitHub</a:t>
-            </a:r>
-          </a:p>
-          <a:p>
-            <a:pPr marL="742950" lvl="2" indent="-342900"/>
-            <a:r>
-              <a:rPr lang="en-AU" dirty="0">
-                <a:hlinkClick r:id="rId3"/>
-              </a:rPr>
-              <a:t>https://</a:t>
-            </a:r>
-            <a:r>
-              <a:rPr lang="en-AU" dirty="0" smtClean="0">
-                <a:hlinkClick r:id="rId3"/>
-              </a:rPr>
-              <a:t>github.com/isop-phmx/studyGroup/issues/19</a:t>
-            </a:r>
-            <a:endParaRPr lang="en-AU" dirty="0" smtClean="0"/>
-          </a:p>
-          <a:p>
-            <a:pPr marL="742950" lvl="2" indent="-342900"/>
-            <a:r>
-              <a:rPr lang="en-AU" dirty="0" smtClean="0"/>
-              <a:t>It is a pre-built Shiny application that we will make amendments to throughout this session</a:t>
-            </a:r>
-            <a:endParaRPr lang="en-US" dirty="0"/>
+              <a:t>applications</a:t>
+            </a:r>
           </a:p>
           <a:p>
             <a:pPr>
@@ -12279,9 +12486,16 @@
             </a:pPr>
             <a:r>
               <a:rPr lang="en-US" sz="2000" dirty="0" smtClean="0"/>
-              <a:t>What is Shiny?</a:t>
-            </a:r>
-            <a:endParaRPr lang="en-US" sz="2000" dirty="0"/>
+              <a:t>What </a:t>
+            </a:r>
+            <a:r>
+              <a:rPr lang="en-US" sz="2000" dirty="0" smtClean="0"/>
+              <a:t>is Shiny</a:t>
+            </a:r>
+            <a:r>
+              <a:rPr lang="en-US" sz="2000" dirty="0" smtClean="0"/>
+              <a:t>?</a:t>
+            </a:r>
           </a:p>
           <a:p>
             <a:pPr>
@@ -12291,7 +12505,7 @@
             </a:pPr>
             <a:r>
               <a:rPr lang="en-US" sz="2000" dirty="0" smtClean="0"/>
-              <a:t>Why would a pharmacometrician want to use Shiny?</a:t>
+              <a:t>Introduction to the Shiny framework</a:t>
             </a:r>
             <a:endParaRPr lang="en-US" sz="2000" dirty="0"/>
           </a:p>
@@ -12303,9 +12517,20 @@
             </a:pPr>
             <a:r>
               <a:rPr lang="en-US" sz="2000" dirty="0" smtClean="0"/>
-              <a:t>Introduction to the Shiny framework</a:t>
+              <a:t>Why would a pharmacometrician want to use Shiny?</a:t>
             </a:r>
             <a:endParaRPr lang="en-US" sz="2000" dirty="0"/>
+          </a:p>
+          <a:p>
+            <a:pPr>
+              <a:lnSpc>
+                <a:spcPct val="100000"/>
+              </a:lnSpc>
+            </a:pPr>
+            <a:r>
+              <a:rPr lang="en-US" sz="2000" dirty="0" smtClean="0"/>
+              <a:t>2-hour hands-on workshop – Jim Hughes</a:t>
+            </a:r>
           </a:p>
           <a:p>
             <a:pPr lvl="1">
@@ -12315,11 +12540,18 @@
             </a:pPr>
             <a:r>
               <a:rPr lang="en-US" sz="1800" dirty="0" smtClean="0"/>
-              <a:t>More advanced concepts can be addressed in later study group </a:t>
-            </a:r>
+              <a:t>Building a Shiny application for a population PK model</a:t>
+            </a:r>
+          </a:p>
+          <a:p>
+            <a:pPr lvl="1">
+              <a:lnSpc>
+                <a:spcPct val="100000"/>
+              </a:lnSpc>
+            </a:pPr>
             <a:r>
               <a:rPr lang="en-US" sz="1800" dirty="0" smtClean="0"/>
-              <a:t>sessions</a:t>
+              <a:t>Using differential equation solver package, deSolve</a:t>
             </a:r>
             <a:endParaRPr lang="en-US" sz="1800" dirty="0" smtClean="0"/>
           </a:p>
@@ -12335,7 +12567,14 @@
   <p:clrMapOvr>
     <a:masterClrMapping/>
   </p:clrMapOvr>
-  <p:transition/>
+  <mc:AlternateContent xmlns:mc="http://schemas.openxmlformats.org/markup-compatibility/2006">
+    <mc:Choice xmlns:p14="http://schemas.microsoft.com/office/powerpoint/2010/main" Requires="p14">
+      <p:transition spd="slow" p14:dur="2000"/>
+    </mc:Choice>
+    <mc:Fallback>
+      <p:transition spd="slow"/>
+    </mc:Fallback>
+  </mc:AlternateContent>
   <p:timing>
     <p:tnLst>
       <p:par>
@@ -12365,85 +12604,6 @@
       </p:grpSpPr>
       <p:sp>
         <p:nvSpPr>
-          <p:cNvPr id="2" name="Text Placeholder 1"/>
-          <p:cNvSpPr>
-            <a:spLocks noGrp="1"/>
-          </p:cNvSpPr>
-          <p:nvPr>
-            <p:ph type="body" sz="quarter" idx="10"/>
-          </p:nvPr>
-        </p:nvSpPr>
-        <p:spPr/>
-        <p:txBody>
-          <a:bodyPr>
-            <a:normAutofit lnSpcReduction="10000"/>
-          </a:bodyPr>
-          <a:lstStyle/>
-          <a:p>
-            <a:r>
-              <a:rPr lang="en-AU" dirty="0" smtClean="0"/>
-              <a:t>Overview</a:t>
-            </a:r>
-            <a:endParaRPr lang="en-AU" dirty="0"/>
-          </a:p>
-        </p:txBody>
-      </p:sp>
-      <p:sp>
-        <p:nvSpPr>
-          <p:cNvPr id="3" name="Text Placeholder 2"/>
-          <p:cNvSpPr>
-            <a:spLocks noGrp="1"/>
-          </p:cNvSpPr>
-          <p:nvPr>
-            <p:ph type="body" sz="quarter" idx="11"/>
-          </p:nvPr>
-        </p:nvSpPr>
-        <p:spPr/>
-        <p:txBody>
-          <a:bodyPr/>
-          <a:lstStyle/>
-          <a:p>
-            <a:r>
-              <a:rPr lang="en-AU" dirty="0" smtClean="0"/>
-              <a:t>Jim</a:t>
-            </a:r>
-            <a:endParaRPr lang="en-AU" dirty="0"/>
-          </a:p>
-        </p:txBody>
-      </p:sp>
-    </p:spTree>
-    <p:extLst>
-      <p:ext uri="{BB962C8B-B14F-4D97-AF65-F5344CB8AC3E}">
-        <p14:creationId xmlns:p14="http://schemas.microsoft.com/office/powerpoint/2010/main" val="2667869327"/>
-      </p:ext>
-    </p:extLst>
-  </p:cSld>
-  <p:clrMapOvr>
-    <a:masterClrMapping/>
-  </p:clrMapOvr>
-  <p:transition/>
-</p:sld>
-</file>
-
-<file path=ppt/slides/slide4.xml><?xml version="1.0" encoding="utf-8"?>
-<p:sld xmlns:a="http://schemas.openxmlformats.org/drawingml/2006/main" xmlns:r="http://schemas.openxmlformats.org/officeDocument/2006/relationships" xmlns:p="http://schemas.openxmlformats.org/presentationml/2006/main">
-  <p:cSld>
-    <p:spTree>
-      <p:nvGrpSpPr>
-        <p:cNvPr id="1" name=""/>
-        <p:cNvGrpSpPr/>
-        <p:nvPr/>
-      </p:nvGrpSpPr>
-      <p:grpSpPr>
-        <a:xfrm>
-          <a:off x="0" y="0"/>
-          <a:ext cx="0" cy="0"/>
-          <a:chOff x="0" y="0"/>
-          <a:chExt cx="0" cy="0"/>
-        </a:xfrm>
-      </p:grpSpPr>
-      <p:sp>
-        <p:nvSpPr>
           <p:cNvPr id="5" name="TextBox 4"/>
           <p:cNvSpPr txBox="1"/>
           <p:nvPr/>
@@ -12471,7 +12631,7 @@
                 <a:ea typeface="Arial" charset="0"/>
                 <a:cs typeface="Arial" charset="0"/>
               </a:rPr>
-              <a:t>4</a:t>
+              <a:t>3</a:t>
             </a:fld>
             <a:endParaRPr lang="en-US" dirty="0">
               <a:latin typeface="Arial" charset="0"/>
@@ -12547,6 +12707,217 @@
 </p:sld>
 </file>
 
+<file path=ppt/slides/slide4.xml><?xml version="1.0" encoding="utf-8"?>
+<p:sld xmlns:a="http://schemas.openxmlformats.org/drawingml/2006/main" xmlns:r="http://schemas.openxmlformats.org/officeDocument/2006/relationships" xmlns:p="http://schemas.openxmlformats.org/presentationml/2006/main">
+  <p:cSld>
+    <p:spTree>
+      <p:nvGrpSpPr>
+        <p:cNvPr id="1" name=""/>
+        <p:cNvGrpSpPr/>
+        <p:nvPr/>
+      </p:nvGrpSpPr>
+      <p:grpSpPr>
+        <a:xfrm>
+          <a:off x="0" y="0"/>
+          <a:ext cx="0" cy="0"/>
+          <a:chOff x="0" y="0"/>
+          <a:chExt cx="0" cy="0"/>
+        </a:xfrm>
+      </p:grpSpPr>
+      <p:sp>
+        <p:nvSpPr>
+          <p:cNvPr id="2" name="Text Placeholder 1"/>
+          <p:cNvSpPr>
+            <a:spLocks noGrp="1"/>
+          </p:cNvSpPr>
+          <p:nvPr>
+            <p:ph type="body" sz="quarter" idx="10"/>
+          </p:nvPr>
+        </p:nvSpPr>
+        <p:spPr/>
+        <p:txBody>
+          <a:bodyPr>
+            <a:normAutofit lnSpcReduction="10000"/>
+          </a:bodyPr>
+          <a:lstStyle/>
+          <a:p>
+            <a:r>
+              <a:rPr lang="en-US" dirty="0" smtClean="0"/>
+              <a:t>Shiny for R</a:t>
+            </a:r>
+            <a:endParaRPr lang="en-US" dirty="0"/>
+          </a:p>
+        </p:txBody>
+      </p:sp>
+      <p:sp>
+        <p:nvSpPr>
+          <p:cNvPr id="3" name="Text Placeholder 2"/>
+          <p:cNvSpPr>
+            <a:spLocks noGrp="1"/>
+          </p:cNvSpPr>
+          <p:nvPr>
+            <p:ph type="body" sz="quarter" idx="11"/>
+          </p:nvPr>
+        </p:nvSpPr>
+        <p:spPr/>
+        <p:txBody>
+          <a:bodyPr>
+            <a:noAutofit/>
+          </a:bodyPr>
+          <a:lstStyle/>
+          <a:p>
+            <a:pPr>
+              <a:lnSpc>
+                <a:spcPct val="100000"/>
+              </a:lnSpc>
+            </a:pPr>
+            <a:r>
+              <a:rPr lang="en-AU" sz="2000" dirty="0"/>
+              <a:t>Interactively show output for R programs</a:t>
+            </a:r>
+          </a:p>
+          <a:p>
+            <a:pPr>
+              <a:lnSpc>
+                <a:spcPct val="100000"/>
+              </a:lnSpc>
+            </a:pPr>
+            <a:r>
+              <a:rPr lang="en-AU" sz="2000" dirty="0" smtClean="0"/>
+              <a:t>Control </a:t>
+            </a:r>
+            <a:r>
+              <a:rPr lang="en-AU" sz="2000" dirty="0"/>
+              <a:t>in coding:</a:t>
+            </a:r>
+          </a:p>
+          <a:p>
+            <a:pPr lvl="1">
+              <a:lnSpc>
+                <a:spcPct val="100000"/>
+              </a:lnSpc>
+            </a:pPr>
+            <a:r>
+              <a:rPr lang="en-AU" sz="1800" dirty="0" smtClean="0"/>
+              <a:t>Appearance </a:t>
+            </a:r>
+            <a:r>
+              <a:rPr lang="en-AU" sz="1800" dirty="0"/>
+              <a:t>of application’s user-interface</a:t>
+            </a:r>
+          </a:p>
+          <a:p>
+            <a:pPr lvl="1">
+              <a:lnSpc>
+                <a:spcPct val="100000"/>
+              </a:lnSpc>
+            </a:pPr>
+            <a:r>
+              <a:rPr lang="en-AU" sz="1800" dirty="0"/>
+              <a:t>Generated output</a:t>
+            </a:r>
+          </a:p>
+          <a:p>
+            <a:pPr>
+              <a:lnSpc>
+                <a:spcPct val="100000"/>
+              </a:lnSpc>
+            </a:pPr>
+            <a:r>
+              <a:rPr lang="en-AU" sz="2000" dirty="0"/>
+              <a:t>Share and view applications without an R installation or files containing R code</a:t>
+            </a:r>
+          </a:p>
+          <a:p>
+            <a:pPr lvl="1">
+              <a:lnSpc>
+                <a:spcPct val="100000"/>
+              </a:lnSpc>
+            </a:pPr>
+            <a:r>
+              <a:rPr lang="en-AU" sz="1800" dirty="0" smtClean="0"/>
+              <a:t>On another </a:t>
+            </a:r>
+            <a:r>
+              <a:rPr lang="en-AU" sz="1800" dirty="0"/>
+              <a:t>computer in a web-browser via the Internet</a:t>
+            </a:r>
+          </a:p>
+        </p:txBody>
+      </p:sp>
+      <p:sp>
+        <p:nvSpPr>
+          <p:cNvPr id="4" name="TextBox 3"/>
+          <p:cNvSpPr txBox="1"/>
+          <p:nvPr/>
+        </p:nvSpPr>
+        <p:spPr>
+          <a:xfrm>
+            <a:off x="8532440" y="6309320"/>
+            <a:ext cx="517710" cy="369332"/>
+          </a:xfrm>
+          <a:prstGeom prst="rect">
+            <a:avLst/>
+          </a:prstGeom>
+          <a:noFill/>
+        </p:spPr>
+        <p:txBody>
+          <a:bodyPr wrap="square" rtlCol="0">
+            <a:spAutoFit/>
+          </a:bodyPr>
+          <a:lstStyle/>
+          <a:p>
+            <a:pPr algn="ctr"/>
+            <a:fld id="{DD3B25F1-C0BA-4247-BD32-6590F555B9A8}" type="slidenum">
+              <a:rPr lang="en-US">
+                <a:solidFill>
+                  <a:schemeClr val="bg1"/>
+                </a:solidFill>
+                <a:latin typeface="Arial" charset="0"/>
+                <a:ea typeface="Arial" charset="0"/>
+                <a:cs typeface="Arial" charset="0"/>
+              </a:rPr>
+              <a:t>4</a:t>
+            </a:fld>
+            <a:endParaRPr lang="en-US" dirty="0">
+              <a:solidFill>
+                <a:schemeClr val="bg1"/>
+              </a:solidFill>
+              <a:latin typeface="Arial" charset="0"/>
+              <a:ea typeface="Arial" charset="0"/>
+              <a:cs typeface="Arial" charset="0"/>
+            </a:endParaRPr>
+          </a:p>
+        </p:txBody>
+      </p:sp>
+    </p:spTree>
+    <p:extLst>
+      <p:ext uri="{BB962C8B-B14F-4D97-AF65-F5344CB8AC3E}">
+        <p14:creationId xmlns:p14="http://schemas.microsoft.com/office/powerpoint/2010/main" val="1195605282"/>
+      </p:ext>
+    </p:extLst>
+  </p:cSld>
+  <p:clrMapOvr>
+    <a:masterClrMapping/>
+  </p:clrMapOvr>
+  <mc:AlternateContent xmlns:mc="http://schemas.openxmlformats.org/markup-compatibility/2006">
+    <mc:Choice xmlns:p14="http://schemas.microsoft.com/office/powerpoint/2010/main" Requires="p14">
+      <p:transition spd="slow" p14:dur="2000"/>
+    </mc:Choice>
+    <mc:Fallback>
+      <p:transition spd="slow"/>
+    </mc:Fallback>
+  </mc:AlternateContent>
+  <p:timing>
+    <p:tnLst>
+      <p:par>
+        <p:cTn id="1" dur="indefinite" restart="never" nodeType="tmRoot"/>
+      </p:par>
+    </p:tnLst>
+  </p:timing>
+</p:sld>
+</file>
+
 <file path=ppt/slides/slide5.xml><?xml version="1.0" encoding="utf-8"?>
 <p:sld xmlns:a="http://schemas.openxmlformats.org/drawingml/2006/main" xmlns:r="http://schemas.openxmlformats.org/officeDocument/2006/relationships" xmlns:p="http://schemas.openxmlformats.org/presentationml/2006/main">
   <p:cSld>
@@ -12566,128 +12937,7 @@
       </p:grpSpPr>
       <p:sp>
         <p:nvSpPr>
-          <p:cNvPr id="2" name="Text Placeholder 1"/>
-          <p:cNvSpPr>
-            <a:spLocks noGrp="1"/>
-          </p:cNvSpPr>
-          <p:nvPr>
-            <p:ph type="body" sz="quarter" idx="10"/>
-          </p:nvPr>
-        </p:nvSpPr>
-        <p:spPr/>
-        <p:txBody>
-          <a:bodyPr>
-            <a:normAutofit lnSpcReduction="10000"/>
-          </a:bodyPr>
-          <a:lstStyle/>
-          <a:p>
-            <a:r>
-              <a:rPr lang="en-US" dirty="0" smtClean="0"/>
-              <a:t>Shiny for R</a:t>
-            </a:r>
-            <a:endParaRPr lang="en-US" dirty="0"/>
-          </a:p>
-        </p:txBody>
-      </p:sp>
-      <p:sp>
-        <p:nvSpPr>
-          <p:cNvPr id="3" name="Text Placeholder 2"/>
-          <p:cNvSpPr>
-            <a:spLocks noGrp="1"/>
-          </p:cNvSpPr>
-          <p:nvPr>
-            <p:ph type="body" sz="quarter" idx="11"/>
-          </p:nvPr>
-        </p:nvSpPr>
-        <p:spPr/>
-        <p:txBody>
-          <a:bodyPr>
-            <a:noAutofit/>
-          </a:bodyPr>
-          <a:lstStyle/>
-          <a:p>
-            <a:pPr>
-              <a:lnSpc>
-                <a:spcPct val="100000"/>
-              </a:lnSpc>
-            </a:pPr>
-            <a:r>
-              <a:rPr lang="en-AU" sz="2000" dirty="0"/>
-              <a:t>Interactively show output for R programs</a:t>
-            </a:r>
-          </a:p>
-          <a:p>
-            <a:pPr>
-              <a:lnSpc>
-                <a:spcPct val="100000"/>
-              </a:lnSpc>
-            </a:pPr>
-            <a:r>
-              <a:rPr lang="en-AU" sz="2000" dirty="0" smtClean="0"/>
-              <a:t>Control </a:t>
-            </a:r>
-            <a:r>
-              <a:rPr lang="en-AU" sz="2000" dirty="0"/>
-              <a:t>in coding:</a:t>
-            </a:r>
-          </a:p>
-          <a:p>
-            <a:pPr lvl="1">
-              <a:lnSpc>
-                <a:spcPct val="100000"/>
-              </a:lnSpc>
-            </a:pPr>
-            <a:r>
-              <a:rPr lang="en-AU" sz="1800" dirty="0" smtClean="0"/>
-              <a:t>Appearance </a:t>
-            </a:r>
-            <a:r>
-              <a:rPr lang="en-AU" sz="1800" dirty="0"/>
-              <a:t>of application’s user-interface</a:t>
-            </a:r>
-          </a:p>
-          <a:p>
-            <a:pPr lvl="1">
-              <a:lnSpc>
-                <a:spcPct val="100000"/>
-              </a:lnSpc>
-            </a:pPr>
-            <a:r>
-              <a:rPr lang="en-AU" sz="1800" dirty="0"/>
-              <a:t>Generated output</a:t>
-            </a:r>
-          </a:p>
-          <a:p>
-            <a:pPr>
-              <a:lnSpc>
-                <a:spcPct val="100000"/>
-              </a:lnSpc>
-            </a:pPr>
-            <a:r>
-              <a:rPr lang="en-AU" sz="2000" dirty="0"/>
-              <a:t>Share and view applications without an R installation or files containing R code</a:t>
-            </a:r>
-          </a:p>
-          <a:p>
-            <a:pPr lvl="1">
-              <a:lnSpc>
-                <a:spcPct val="100000"/>
-              </a:lnSpc>
-            </a:pPr>
-            <a:r>
-              <a:rPr lang="en-AU" sz="1800" dirty="0" smtClean="0"/>
-              <a:t>On another </a:t>
-            </a:r>
-            <a:r>
-              <a:rPr lang="en-AU" sz="1800" dirty="0"/>
-              <a:t>computer in a web-browser via the Internet</a:t>
-            </a:r>
-          </a:p>
-        </p:txBody>
-      </p:sp>
-      <p:sp>
-        <p:nvSpPr>
-          <p:cNvPr id="4" name="TextBox 3"/>
+          <p:cNvPr id="26" name="TextBox 25"/>
           <p:cNvSpPr txBox="1"/>
           <p:nvPr/>
         </p:nvSpPr>
@@ -12708,96 +12958,13 @@
           <a:lstStyle/>
           <a:p>
             <a:pPr algn="ctr"/>
-            <a:fld id="{DD3B25F1-C0BA-4247-BD32-6590F555B9A8}" type="slidenum">
-              <a:rPr lang="en-US">
-                <a:solidFill>
-                  <a:schemeClr val="bg1"/>
-                </a:solidFill>
-                <a:latin typeface="Arial" charset="0"/>
-                <a:ea typeface="Arial" charset="0"/>
-                <a:cs typeface="Arial" charset="0"/>
-              </a:rPr>
-              <a:t>5</a:t>
-            </a:fld>
-            <a:endParaRPr lang="en-US" dirty="0">
-              <a:solidFill>
-                <a:schemeClr val="bg1"/>
-              </a:solidFill>
-              <a:latin typeface="Arial" charset="0"/>
-              <a:ea typeface="Arial" charset="0"/>
-              <a:cs typeface="Arial" charset="0"/>
-            </a:endParaRPr>
-          </a:p>
-        </p:txBody>
-      </p:sp>
-    </p:spTree>
-    <p:extLst>
-      <p:ext uri="{BB962C8B-B14F-4D97-AF65-F5344CB8AC3E}">
-        <p14:creationId xmlns:p14="http://schemas.microsoft.com/office/powerpoint/2010/main" val="1195605282"/>
-      </p:ext>
-    </p:extLst>
-  </p:cSld>
-  <p:clrMapOvr>
-    <a:masterClrMapping/>
-  </p:clrMapOvr>
-  <p:transition/>
-  <p:timing>
-    <p:tnLst>
-      <p:par>
-        <p:cTn id="1" dur="indefinite" restart="never" nodeType="tmRoot"/>
-      </p:par>
-    </p:tnLst>
-  </p:timing>
-</p:sld>
-</file>
-
-<file path=ppt/slides/slide6.xml><?xml version="1.0" encoding="utf-8"?>
-<p:sld xmlns:a="http://schemas.openxmlformats.org/drawingml/2006/main" xmlns:r="http://schemas.openxmlformats.org/officeDocument/2006/relationships" xmlns:p="http://schemas.openxmlformats.org/presentationml/2006/main">
-  <p:cSld>
-    <p:spTree>
-      <p:nvGrpSpPr>
-        <p:cNvPr id="1" name=""/>
-        <p:cNvGrpSpPr/>
-        <p:nvPr/>
-      </p:nvGrpSpPr>
-      <p:grpSpPr>
-        <a:xfrm>
-          <a:off x="0" y="0"/>
-          <a:ext cx="0" cy="0"/>
-          <a:chOff x="0" y="0"/>
-          <a:chExt cx="0" cy="0"/>
-        </a:xfrm>
-      </p:grpSpPr>
-      <p:sp>
-        <p:nvSpPr>
-          <p:cNvPr id="26" name="TextBox 25"/>
-          <p:cNvSpPr txBox="1"/>
-          <p:nvPr/>
-        </p:nvSpPr>
-        <p:spPr>
-          <a:xfrm>
-            <a:off x="8532440" y="6309320"/>
-            <a:ext cx="517710" cy="369332"/>
-          </a:xfrm>
-          <a:prstGeom prst="rect">
-            <a:avLst/>
-          </a:prstGeom>
-          <a:noFill/>
-        </p:spPr>
-        <p:txBody>
-          <a:bodyPr wrap="square" rtlCol="0">
-            <a:spAutoFit/>
-          </a:bodyPr>
-          <a:lstStyle/>
-          <a:p>
-            <a:pPr algn="ctr"/>
             <a:fld id="{81C2BCEA-7E37-9242-9BDE-45D4C5E70AC6}" type="slidenum">
               <a:rPr lang="en-US" smtClean="0">
                 <a:latin typeface="Arial" charset="0"/>
                 <a:ea typeface="Arial" charset="0"/>
                 <a:cs typeface="Arial" charset="0"/>
               </a:rPr>
-              <a:t>6</a:t>
+              <a:t>5</a:t>
             </a:fld>
             <a:endParaRPr lang="en-US" dirty="0">
               <a:latin typeface="Arial" charset="0"/>
@@ -13054,6 +13221,287 @@
 </p:sld>
 </file>
 
+<file path=ppt/slides/slide6.xml><?xml version="1.0" encoding="utf-8"?>
+<p:sld xmlns:a="http://schemas.openxmlformats.org/drawingml/2006/main" xmlns:r="http://schemas.openxmlformats.org/officeDocument/2006/relationships" xmlns:p="http://schemas.openxmlformats.org/presentationml/2006/main">
+  <p:cSld>
+    <p:spTree>
+      <p:nvGrpSpPr>
+        <p:cNvPr id="1" name=""/>
+        <p:cNvGrpSpPr/>
+        <p:nvPr/>
+      </p:nvGrpSpPr>
+      <p:grpSpPr>
+        <a:xfrm>
+          <a:off x="0" y="0"/>
+          <a:ext cx="0" cy="0"/>
+          <a:chOff x="0" y="0"/>
+          <a:chExt cx="0" cy="0"/>
+        </a:xfrm>
+      </p:grpSpPr>
+      <p:sp>
+        <p:nvSpPr>
+          <p:cNvPr id="2" name="Text Placeholder 1"/>
+          <p:cNvSpPr>
+            <a:spLocks noGrp="1"/>
+          </p:cNvSpPr>
+          <p:nvPr>
+            <p:ph type="body" sz="quarter" idx="10"/>
+          </p:nvPr>
+        </p:nvSpPr>
+        <p:spPr/>
+        <p:txBody>
+          <a:bodyPr>
+            <a:normAutofit lnSpcReduction="10000"/>
+          </a:bodyPr>
+          <a:lstStyle/>
+          <a:p>
+            <a:r>
+              <a:rPr lang="en-US" dirty="0" smtClean="0">
+                <a:solidFill>
+                  <a:srgbClr val="2C25C8"/>
+                </a:solidFill>
+              </a:rPr>
+              <a:t>Structure</a:t>
+            </a:r>
+            <a:r>
+              <a:rPr lang="en-US" dirty="0" smtClean="0"/>
+              <a:t> of a Shiny Application</a:t>
+            </a:r>
+            <a:endParaRPr lang="en-US" dirty="0"/>
+          </a:p>
+        </p:txBody>
+      </p:sp>
+      <p:sp>
+        <p:nvSpPr>
+          <p:cNvPr id="3" name="Text Placeholder 2"/>
+          <p:cNvSpPr>
+            <a:spLocks noGrp="1"/>
+          </p:cNvSpPr>
+          <p:nvPr>
+            <p:ph type="body" sz="quarter" idx="11"/>
+          </p:nvPr>
+        </p:nvSpPr>
+        <p:spPr/>
+        <p:txBody>
+          <a:bodyPr>
+            <a:normAutofit/>
+          </a:bodyPr>
+          <a:lstStyle/>
+          <a:p>
+            <a:pPr>
+              <a:lnSpc>
+                <a:spcPct val="100000"/>
+              </a:lnSpc>
+            </a:pPr>
+            <a:r>
+              <a:rPr lang="en-AU" sz="2000" dirty="0"/>
+              <a:t>ui.R</a:t>
+            </a:r>
+          </a:p>
+          <a:p>
+            <a:pPr lvl="1">
+              <a:lnSpc>
+                <a:spcPct val="100000"/>
+              </a:lnSpc>
+            </a:pPr>
+            <a:r>
+              <a:rPr lang="en-AU" sz="1800" dirty="0"/>
+              <a:t>Application’s graphical user-interface</a:t>
+            </a:r>
+          </a:p>
+          <a:p>
+            <a:pPr>
+              <a:lnSpc>
+                <a:spcPct val="100000"/>
+              </a:lnSpc>
+            </a:pPr>
+            <a:r>
+              <a:rPr lang="en-AU" sz="2000" dirty="0" err="1"/>
+              <a:t>server.R</a:t>
+            </a:r>
+            <a:endParaRPr lang="en-AU" sz="2000" dirty="0"/>
+          </a:p>
+          <a:p>
+            <a:pPr lvl="1">
+              <a:lnSpc>
+                <a:spcPct val="100000"/>
+              </a:lnSpc>
+            </a:pPr>
+            <a:r>
+              <a:rPr lang="en-AU" sz="1800" dirty="0"/>
+              <a:t>Instructions for turning input into output to be displayed in the user-interface</a:t>
+            </a:r>
+          </a:p>
+          <a:p>
+            <a:pPr>
+              <a:lnSpc>
+                <a:spcPct val="100000"/>
+              </a:lnSpc>
+            </a:pPr>
+            <a:r>
+              <a:rPr lang="en-AU" sz="2000" dirty="0"/>
+              <a:t>Need to be saved in the same folder</a:t>
+            </a:r>
+          </a:p>
+        </p:txBody>
+      </p:sp>
+      <p:sp>
+        <p:nvSpPr>
+          <p:cNvPr id="4" name="TextBox 3"/>
+          <p:cNvSpPr txBox="1"/>
+          <p:nvPr/>
+        </p:nvSpPr>
+        <p:spPr>
+          <a:xfrm>
+            <a:off x="8532440" y="6309320"/>
+            <a:ext cx="517710" cy="369332"/>
+          </a:xfrm>
+          <a:prstGeom prst="rect">
+            <a:avLst/>
+          </a:prstGeom>
+          <a:noFill/>
+        </p:spPr>
+        <p:txBody>
+          <a:bodyPr wrap="square" rtlCol="0">
+            <a:spAutoFit/>
+          </a:bodyPr>
+          <a:lstStyle/>
+          <a:p>
+            <a:pPr algn="ctr"/>
+            <a:fld id="{926FF40F-FDB6-CC42-B6ED-28CED6D0B73A}" type="slidenum">
+              <a:rPr lang="en-US">
+                <a:solidFill>
+                  <a:schemeClr val="bg1"/>
+                </a:solidFill>
+                <a:latin typeface="Arial" charset="0"/>
+                <a:ea typeface="Arial" charset="0"/>
+                <a:cs typeface="Arial" charset="0"/>
+              </a:rPr>
+              <a:t>6</a:t>
+            </a:fld>
+            <a:endParaRPr lang="en-US" dirty="0">
+              <a:solidFill>
+                <a:schemeClr val="bg1"/>
+              </a:solidFill>
+              <a:latin typeface="Arial" charset="0"/>
+              <a:ea typeface="Arial" charset="0"/>
+              <a:cs typeface="Arial" charset="0"/>
+            </a:endParaRPr>
+          </a:p>
+        </p:txBody>
+      </p:sp>
+      <p:pic>
+        <p:nvPicPr>
+          <p:cNvPr id="7" name="Picture 6"/>
+          <p:cNvPicPr>
+            <a:picLocks noChangeAspect="1"/>
+          </p:cNvPicPr>
+          <p:nvPr/>
+        </p:nvPicPr>
+        <p:blipFill rotWithShape="1">
+          <a:blip r:embed="rId3">
+            <a:extLst>
+              <a:ext uri="{28A0092B-C50C-407E-A947-70E740481C1C}">
+                <a14:useLocalDpi xmlns:a14="http://schemas.microsoft.com/office/drawing/2010/main" val="0"/>
+              </a:ext>
+            </a:extLst>
+          </a:blip>
+          <a:srcRect l="2051" t="2689" r="1891" b="16318"/>
+          <a:stretch/>
+        </p:blipFill>
+        <p:spPr>
+          <a:xfrm>
+            <a:off x="4258881" y="3145977"/>
+            <a:ext cx="4606686" cy="2371255"/>
+          </a:xfrm>
+          <a:prstGeom prst="rect">
+            <a:avLst/>
+          </a:prstGeom>
+          <a:ln>
+            <a:solidFill>
+              <a:schemeClr val="bg1">
+                <a:lumMod val="50000"/>
+              </a:schemeClr>
+            </a:solidFill>
+          </a:ln>
+        </p:spPr>
+      </p:pic>
+      <p:sp>
+        <p:nvSpPr>
+          <p:cNvPr id="8" name="Rectangle 7"/>
+          <p:cNvSpPr/>
+          <p:nvPr/>
+        </p:nvSpPr>
+        <p:spPr>
+          <a:xfrm>
+            <a:off x="7308669" y="3723588"/>
+            <a:ext cx="1556898" cy="311084"/>
+          </a:xfrm>
+          <a:prstGeom prst="rect">
+            <a:avLst/>
+          </a:prstGeom>
+          <a:solidFill>
+            <a:srgbClr val="FFFF00">
+              <a:alpha val="28000"/>
+            </a:srgbClr>
+          </a:solidFill>
+          <a:ln>
+            <a:noFill/>
+          </a:ln>
+        </p:spPr>
+        <p:style>
+          <a:lnRef idx="2">
+            <a:schemeClr val="accent1">
+              <a:shade val="50000"/>
+            </a:schemeClr>
+          </a:lnRef>
+          <a:fillRef idx="1">
+            <a:schemeClr val="accent1"/>
+          </a:fillRef>
+          <a:effectRef idx="0">
+            <a:schemeClr val="accent1"/>
+          </a:effectRef>
+          <a:fontRef idx="minor">
+            <a:schemeClr val="lt1"/>
+          </a:fontRef>
+        </p:style>
+        <p:txBody>
+          <a:bodyPr rtlCol="0" anchor="ctr"/>
+          <a:lstStyle/>
+          <a:p>
+            <a:pPr algn="ctr"/>
+            <a:endParaRPr lang="en-US"/>
+          </a:p>
+        </p:txBody>
+      </p:sp>
+    </p:spTree>
+    <p:extLst>
+      <p:ext uri="{BB962C8B-B14F-4D97-AF65-F5344CB8AC3E}">
+        <p14:creationId xmlns:p14="http://schemas.microsoft.com/office/powerpoint/2010/main" val="1974044557"/>
+      </p:ext>
+    </p:extLst>
+  </p:cSld>
+  <p:clrMapOvr>
+    <a:masterClrMapping/>
+  </p:clrMapOvr>
+  <mc:AlternateContent xmlns:mc="http://schemas.openxmlformats.org/markup-compatibility/2006">
+    <mc:Choice xmlns:p14="http://schemas.microsoft.com/office/powerpoint/2010/main" Requires="p14">
+      <p:transition spd="slow" p14:dur="2000"/>
+    </mc:Choice>
+    <mc:Fallback>
+      <p:transition spd="slow"/>
+    </mc:Fallback>
+  </mc:AlternateContent>
+  <p:timing>
+    <p:tnLst>
+      <p:par>
+        <p:cTn id="1" dur="indefinite" restart="never" nodeType="tmRoot"/>
+      </p:par>
+    </p:tnLst>
+  </p:timing>
+</p:sld>
+</file>
+
 <file path=ppt/slides/slide7.xml><?xml version="1.0" encoding="utf-8"?>
 <p:sld xmlns:a="http://schemas.openxmlformats.org/drawingml/2006/main" xmlns:r="http://schemas.openxmlformats.org/officeDocument/2006/relationships" xmlns:p="http://schemas.openxmlformats.org/presentationml/2006/main">
   <p:cSld>
@@ -13089,16 +13537,8 @@
           <a:lstStyle/>
           <a:p>
             <a:r>
-              <a:rPr lang="en-US" dirty="0" smtClean="0">
-                <a:solidFill>
-                  <a:srgbClr val="2C25C8"/>
-                </a:solidFill>
-              </a:rPr>
-              <a:t>Structure</a:t>
-            </a:r>
-            <a:r>
               <a:rPr lang="en-US" dirty="0" smtClean="0"/>
-              <a:t> of a Shiny Application</a:t>
+              <a:t>ui.R: Creating a user-interface</a:t>
             </a:r>
             <a:endParaRPr lang="en-US" dirty="0"/>
           </a:p>
@@ -13117,7 +13557,7 @@
         <p:spPr/>
         <p:txBody>
           <a:bodyPr>
-            <a:normAutofit/>
+            <a:noAutofit/>
           </a:bodyPr>
           <a:lstStyle/>
           <a:p>
@@ -13128,18 +13568,7 @@
             </a:pPr>
             <a:r>
               <a:rPr lang="en-AU" sz="2000" dirty="0"/>
-              <a:t>ui.R</a:t>
-            </a:r>
-          </a:p>
-          <a:p>
-            <a:pPr lvl="1">
-              <a:lnSpc>
-                <a:spcPct val="100000"/>
-              </a:lnSpc>
-            </a:pPr>
-            <a:r>
-              <a:rPr lang="en-AU" sz="1800" dirty="0"/>
-              <a:t>Application’s graphical user-interface</a:t>
+              <a:t>Variety of customisable layouts and pre-built widgets</a:t>
             </a:r>
           </a:p>
           <a:p>
@@ -13149,20 +13578,8 @@
               </a:lnSpc>
             </a:pPr>
             <a:r>
-              <a:rPr lang="en-AU" sz="2000" dirty="0" err="1"/>
-              <a:t>server.R</a:t>
-            </a:r>
-            <a:endParaRPr lang="en-AU" sz="2000" dirty="0"/>
-          </a:p>
-          <a:p>
-            <a:pPr lvl="1">
-              <a:lnSpc>
-                <a:spcPct val="100000"/>
-              </a:lnSpc>
-            </a:pPr>
-            <a:r>
-              <a:rPr lang="en-AU" sz="1800" dirty="0"/>
-              <a:t>Instructions for turning input into output to be displayed in the user-interface</a:t>
+              <a:rPr lang="en-AU" sz="2000" dirty="0"/>
+              <a:t>Hierarchical structure</a:t>
             </a:r>
           </a:p>
           <a:p>
@@ -13173,7 +13590,183 @@
             </a:pPr>
             <a:r>
               <a:rPr lang="en-AU" sz="2000" dirty="0"/>
-              <a:t>Need to be saved in the same folder</a:t>
+              <a:t>Three levels for creating an interface:</a:t>
+            </a:r>
+          </a:p>
+          <a:p>
+            <a:pPr marL="914400" lvl="1" indent="-457200">
+              <a:lnSpc>
+                <a:spcPct val="100000"/>
+              </a:lnSpc>
+              <a:buFont typeface="+mj-lt"/>
+              <a:buAutoNum type="arabicPeriod"/>
+            </a:pPr>
+            <a:r>
+              <a:rPr lang="en-AU" sz="1800" dirty="0"/>
+              <a:t>Layout function</a:t>
+            </a:r>
+          </a:p>
+          <a:p>
+            <a:pPr marL="1771650" lvl="3" indent="-457200"/>
+            <a:r>
+              <a:rPr lang="en-AU" sz="1800" dirty="0" err="1">
+                <a:latin typeface="Monaco" charset="0"/>
+                <a:ea typeface="Monaco" charset="0"/>
+                <a:cs typeface="Monaco" charset="0"/>
+              </a:rPr>
+              <a:t>fluidPage</a:t>
+            </a:r>
+            <a:r>
+              <a:rPr lang="en-AU" sz="1800" dirty="0">
+                <a:latin typeface="Monaco" charset="0"/>
+                <a:ea typeface="Monaco" charset="0"/>
+                <a:cs typeface="Monaco" charset="0"/>
+              </a:rPr>
+              <a:t>, </a:t>
+            </a:r>
+            <a:r>
+              <a:rPr lang="en-AU" sz="1800" dirty="0" err="1" smtClean="0">
+                <a:latin typeface="Monaco" charset="0"/>
+                <a:ea typeface="Monaco" charset="0"/>
+                <a:cs typeface="Monaco" charset="0"/>
+              </a:rPr>
+              <a:t>fixedPage</a:t>
+            </a:r>
+            <a:endParaRPr lang="en-AU" sz="1800" dirty="0">
+              <a:latin typeface="Monaco" charset="0"/>
+              <a:ea typeface="Monaco" charset="0"/>
+              <a:cs typeface="Monaco" charset="0"/>
+            </a:endParaRPr>
+          </a:p>
+          <a:p>
+            <a:pPr marL="914400" lvl="1" indent="-457200">
+              <a:lnSpc>
+                <a:spcPct val="100000"/>
+              </a:lnSpc>
+              <a:buFont typeface="+mj-lt"/>
+              <a:buAutoNum type="arabicPeriod"/>
+            </a:pPr>
+            <a:r>
+              <a:rPr lang="en-AU" sz="1800" dirty="0"/>
+              <a:t>Positioning function</a:t>
+            </a:r>
+          </a:p>
+          <a:p>
+            <a:pPr marL="1771650" lvl="3" indent="-457200"/>
+            <a:r>
+              <a:rPr lang="en-AU" sz="1800" dirty="0" err="1">
+                <a:latin typeface="Monaco" charset="0"/>
+                <a:ea typeface="Monaco" charset="0"/>
+                <a:cs typeface="Monaco" charset="0"/>
+              </a:rPr>
+              <a:t>fluidRow</a:t>
+            </a:r>
+            <a:r>
+              <a:rPr lang="en-AU" sz="1800" dirty="0">
+                <a:latin typeface="Monaco" charset="0"/>
+                <a:ea typeface="Monaco" charset="0"/>
+                <a:cs typeface="Monaco" charset="0"/>
+              </a:rPr>
+              <a:t>, </a:t>
+            </a:r>
+            <a:r>
+              <a:rPr lang="en-AU" sz="1800" dirty="0" err="1">
+                <a:latin typeface="Monaco" charset="0"/>
+                <a:ea typeface="Monaco" charset="0"/>
+                <a:cs typeface="Monaco" charset="0"/>
+              </a:rPr>
+              <a:t>fixedRow</a:t>
+            </a:r>
+            <a:r>
+              <a:rPr lang="en-AU" sz="1800" dirty="0">
+                <a:latin typeface="Monaco" charset="0"/>
+                <a:ea typeface="Monaco" charset="0"/>
+                <a:cs typeface="Monaco" charset="0"/>
+              </a:rPr>
+              <a:t>, </a:t>
+            </a:r>
+            <a:r>
+              <a:rPr lang="en-AU" sz="1800" dirty="0" err="1" smtClean="0">
+                <a:latin typeface="Monaco" charset="0"/>
+                <a:ea typeface="Monaco" charset="0"/>
+                <a:cs typeface="Monaco" charset="0"/>
+              </a:rPr>
+              <a:t>sidebarLayout</a:t>
+            </a:r>
+            <a:endParaRPr lang="en-AU" sz="1800" dirty="0" smtClean="0">
+              <a:latin typeface="Monaco" charset="0"/>
+              <a:ea typeface="Monaco" charset="0"/>
+              <a:cs typeface="Monaco" charset="0"/>
+            </a:endParaRPr>
+          </a:p>
+          <a:p>
+            <a:pPr marL="914400" lvl="1" indent="-457200">
+              <a:lnSpc>
+                <a:spcPct val="100000"/>
+              </a:lnSpc>
+              <a:buFont typeface="+mj-lt"/>
+              <a:buAutoNum type="arabicPeriod"/>
+            </a:pPr>
+            <a:r>
+              <a:rPr lang="en-AU" sz="1800" dirty="0" smtClean="0"/>
+              <a:t>Element</a:t>
+            </a:r>
+          </a:p>
+          <a:p>
+            <a:pPr marL="1771650" lvl="3" indent="-457200"/>
+            <a:r>
+              <a:rPr lang="en-AU" sz="1800" dirty="0" smtClean="0">
+                <a:latin typeface="Arial" charset="0"/>
+                <a:ea typeface="Arial" charset="0"/>
+                <a:cs typeface="Arial" charset="0"/>
+              </a:rPr>
+              <a:t>Widget </a:t>
+            </a:r>
+            <a:r>
+              <a:rPr lang="en-AU" sz="1800" dirty="0">
+                <a:latin typeface="Arial" charset="0"/>
+                <a:ea typeface="Arial" charset="0"/>
+                <a:cs typeface="Arial" charset="0"/>
+              </a:rPr>
+              <a:t>functions</a:t>
+            </a:r>
+          </a:p>
+          <a:p>
+            <a:pPr marL="1771650" lvl="3" indent="-457200"/>
+            <a:r>
+              <a:rPr lang="en-AU" sz="1800" dirty="0">
+                <a:latin typeface="Arial" charset="0"/>
+                <a:ea typeface="Arial" charset="0"/>
+                <a:cs typeface="Arial" charset="0"/>
+              </a:rPr>
+              <a:t>Reactive output functions</a:t>
+            </a:r>
+          </a:p>
+          <a:p>
+            <a:pPr marL="1771650" lvl="3" indent="-457200"/>
+            <a:r>
+              <a:rPr lang="en-AU" sz="1800" dirty="0" smtClean="0">
+                <a:latin typeface="Arial" charset="0"/>
+                <a:ea typeface="Arial" charset="0"/>
+                <a:cs typeface="Arial" charset="0"/>
+              </a:rPr>
+              <a:t>Headings, line breaks, images</a:t>
+            </a:r>
+            <a:endParaRPr lang="en-AU" sz="1800" dirty="0">
+              <a:latin typeface="Arial" charset="0"/>
+              <a:ea typeface="Arial" charset="0"/>
+              <a:cs typeface="Arial" charset="0"/>
+            </a:endParaRPr>
+          </a:p>
+          <a:p>
+            <a:pPr marL="514350" indent="-457200">
+              <a:lnSpc>
+                <a:spcPct val="100000"/>
+              </a:lnSpc>
+            </a:pPr>
+            <a:r>
+              <a:rPr lang="en-AU" sz="2000" dirty="0"/>
+              <a:t>Functions of the same level are written as a string within their superior function, separated by “,”</a:t>
             </a:r>
           </a:p>
         </p:txBody>
@@ -13201,7 +13794,7 @@
           <a:lstStyle/>
           <a:p>
             <a:pPr algn="ctr"/>
-            <a:fld id="{926FF40F-FDB6-CC42-B6ED-28CED6D0B73A}" type="slidenum">
+            <a:fld id="{EB74E232-56C2-5245-A9FE-F251D8AD8F4F}" type="slidenum">
               <a:rPr lang="en-US">
                 <a:solidFill>
                   <a:schemeClr val="bg1"/>
@@ -13223,53 +13816,24 @@
           </a:p>
         </p:txBody>
       </p:sp>
-      <p:pic>
-        <p:nvPicPr>
-          <p:cNvPr id="6" name="Picture 5"/>
-          <p:cNvPicPr>
-            <a:picLocks noChangeAspect="1"/>
-          </p:cNvPicPr>
-          <p:nvPr/>
-        </p:nvPicPr>
-        <p:blipFill rotWithShape="1">
-          <a:blip r:embed="rId3" cstate="print">
-            <a:extLst>
-              <a:ext uri="{28A0092B-C50C-407E-A947-70E740481C1C}">
-                <a14:useLocalDpi xmlns:a14="http://schemas.microsoft.com/office/drawing/2010/main" val="0"/>
-              </a:ext>
-            </a:extLst>
-          </a:blip>
-          <a:srcRect/>
-          <a:stretch/>
-        </p:blipFill>
-        <p:spPr>
-          <a:xfrm>
-            <a:off x="5055249" y="2629285"/>
-            <a:ext cx="3915133" cy="2574930"/>
-          </a:xfrm>
-          <a:prstGeom prst="rect">
-            <a:avLst/>
-          </a:prstGeom>
-          <a:ln>
-            <a:solidFill>
-              <a:schemeClr val="bg1">
-                <a:lumMod val="50000"/>
-              </a:schemeClr>
-            </a:solidFill>
-          </a:ln>
-        </p:spPr>
-      </p:pic>
     </p:spTree>
     <p:extLst>
       <p:ext uri="{BB962C8B-B14F-4D97-AF65-F5344CB8AC3E}">
-        <p14:creationId xmlns:p14="http://schemas.microsoft.com/office/powerpoint/2010/main" val="1974044557"/>
+        <p14:creationId xmlns:p14="http://schemas.microsoft.com/office/powerpoint/2010/main" val="1068838038"/>
       </p:ext>
     </p:extLst>
   </p:cSld>
   <p:clrMapOvr>
     <a:masterClrMapping/>
   </p:clrMapOvr>
-  <p:transition/>
+  <mc:AlternateContent xmlns:mc="http://schemas.openxmlformats.org/markup-compatibility/2006">
+    <mc:Choice xmlns:p14="http://schemas.microsoft.com/office/powerpoint/2010/main" Requires="p14">
+      <p:transition spd="slow" p14:dur="2000"/>
+    </mc:Choice>
+    <mc:Fallback>
+      <p:transition spd="slow"/>
+    </mc:Fallback>
+  </mc:AlternateContent>
   <p:timing>
     <p:tnLst>
       <p:par>
@@ -13316,7 +13880,7 @@
           <a:p>
             <a:r>
               <a:rPr lang="en-US" dirty="0" smtClean="0"/>
-              <a:t>ui.R: Creating a user-interface</a:t>
+              <a:t>ui.R: Shiny Widgets</a:t>
             </a:r>
             <a:endParaRPr lang="en-US" dirty="0"/>
           </a:p>
@@ -13346,7 +13910,7 @@
             </a:pPr>
             <a:r>
               <a:rPr lang="en-AU" sz="2000" dirty="0"/>
-              <a:t>Variety of customisable layouts and pre-built widgets</a:t>
+              <a:t>Interactive elements</a:t>
             </a:r>
           </a:p>
           <a:p>
@@ -13357,7 +13921,7 @@
             </a:pPr>
             <a:r>
               <a:rPr lang="en-AU" sz="2000" dirty="0"/>
-              <a:t>Hierarchical structure</a:t>
+              <a:t>Allow users to explore different values or categories of parameters or variables</a:t>
             </a:r>
           </a:p>
           <a:p>
@@ -13368,183 +13932,105 @@
             </a:pPr>
             <a:r>
               <a:rPr lang="en-AU" sz="2000" dirty="0"/>
-              <a:t>Three levels for creating an interface:</a:t>
-            </a:r>
-          </a:p>
-          <a:p>
-            <a:pPr marL="914400" lvl="1" indent="-457200">
+              <a:t>Store values chosen by the user</a:t>
+            </a:r>
+          </a:p>
+          <a:p>
+            <a:pPr lvl="1">
               <a:lnSpc>
                 <a:spcPct val="100000"/>
               </a:lnSpc>
-              <a:buFont typeface="+mj-lt"/>
-              <a:buAutoNum type="arabicPeriod"/>
             </a:pPr>
             <a:r>
               <a:rPr lang="en-AU" sz="1800" dirty="0"/>
-              <a:t>Layout function</a:t>
-            </a:r>
-          </a:p>
-          <a:p>
-            <a:pPr marL="1771650" lvl="3" indent="-457200"/>
-            <a:r>
-              <a:rPr lang="en-AU" sz="1800" dirty="0" err="1">
-                <a:latin typeface="Monaco" charset="0"/>
-                <a:ea typeface="Monaco" charset="0"/>
-                <a:cs typeface="Monaco" charset="0"/>
-              </a:rPr>
-              <a:t>fluidPage</a:t>
-            </a:r>
-            <a:r>
-              <a:rPr lang="en-AU" sz="1800" dirty="0">
-                <a:latin typeface="Monaco" charset="0"/>
-                <a:ea typeface="Monaco" charset="0"/>
-                <a:cs typeface="Monaco" charset="0"/>
-              </a:rPr>
-              <a:t>, </a:t>
-            </a:r>
-            <a:r>
-              <a:rPr lang="en-AU" sz="1800" dirty="0" err="1" smtClean="0">
-                <a:latin typeface="Monaco" charset="0"/>
-                <a:ea typeface="Monaco" charset="0"/>
-                <a:cs typeface="Monaco" charset="0"/>
-              </a:rPr>
-              <a:t>fixedPage</a:t>
-            </a:r>
-            <a:endParaRPr lang="en-AU" sz="1800" dirty="0">
-              <a:latin typeface="Monaco" charset="0"/>
-              <a:ea typeface="Monaco" charset="0"/>
-              <a:cs typeface="Monaco" charset="0"/>
-            </a:endParaRPr>
-          </a:p>
-          <a:p>
-            <a:pPr marL="914400" lvl="1" indent="-457200">
+              <a:t>That are involved in a cascade of functions in </a:t>
+            </a:r>
+            <a:r>
+              <a:rPr lang="en-AU" sz="1800" dirty="0" err="1"/>
+              <a:t>server.R</a:t>
+            </a:r>
+            <a:r>
+              <a:rPr lang="en-AU" sz="1800" dirty="0"/>
+              <a:t> to produce the displayed output</a:t>
+            </a:r>
+          </a:p>
+          <a:p>
+            <a:pPr>
               <a:lnSpc>
                 <a:spcPct val="100000"/>
               </a:lnSpc>
-              <a:buFont typeface="+mj-lt"/>
-              <a:buAutoNum type="arabicPeriod"/>
-            </a:pPr>
-            <a:r>
-              <a:rPr lang="en-AU" sz="1800" dirty="0"/>
-              <a:t>Positioning function</a:t>
-            </a:r>
-          </a:p>
-          <a:p>
-            <a:pPr marL="1771650" lvl="3" indent="-457200"/>
-            <a:r>
-              <a:rPr lang="en-AU" sz="1800" dirty="0" err="1">
-                <a:latin typeface="Monaco" charset="0"/>
-                <a:ea typeface="Monaco" charset="0"/>
-                <a:cs typeface="Monaco" charset="0"/>
-              </a:rPr>
-              <a:t>fluidRow</a:t>
-            </a:r>
-            <a:r>
-              <a:rPr lang="en-AU" sz="1800" dirty="0">
-                <a:latin typeface="Monaco" charset="0"/>
-                <a:ea typeface="Monaco" charset="0"/>
-                <a:cs typeface="Monaco" charset="0"/>
-              </a:rPr>
-              <a:t>, </a:t>
-            </a:r>
-            <a:r>
-              <a:rPr lang="en-AU" sz="1800" dirty="0" err="1">
-                <a:latin typeface="Monaco" charset="0"/>
-                <a:ea typeface="Monaco" charset="0"/>
-                <a:cs typeface="Monaco" charset="0"/>
-              </a:rPr>
-              <a:t>fixedRow</a:t>
-            </a:r>
-            <a:r>
-              <a:rPr lang="en-AU" sz="1800" dirty="0">
-                <a:latin typeface="Monaco" charset="0"/>
-                <a:ea typeface="Monaco" charset="0"/>
-                <a:cs typeface="Monaco" charset="0"/>
-              </a:rPr>
-              <a:t>, </a:t>
-            </a:r>
-            <a:r>
-              <a:rPr lang="en-AU" sz="1800" dirty="0" err="1" smtClean="0">
-                <a:latin typeface="Monaco" charset="0"/>
-                <a:ea typeface="Monaco" charset="0"/>
-                <a:cs typeface="Monaco" charset="0"/>
-              </a:rPr>
-              <a:t>sidebarLayout</a:t>
-            </a:r>
-            <a:endParaRPr lang="en-AU" sz="1800" dirty="0" smtClean="0">
-              <a:latin typeface="Monaco" charset="0"/>
-              <a:ea typeface="Monaco" charset="0"/>
-              <a:cs typeface="Monaco" charset="0"/>
-            </a:endParaRPr>
-          </a:p>
-          <a:p>
-            <a:pPr marL="914400" lvl="1" indent="-457200">
+            </a:pPr>
+            <a:r>
+              <a:rPr lang="en-AU" sz="2000" dirty="0"/>
+              <a:t>Changing a widget, changes the resulting output object</a:t>
+            </a:r>
+          </a:p>
+          <a:p>
+            <a:pPr>
               <a:lnSpc>
                 <a:spcPct val="100000"/>
               </a:lnSpc>
-              <a:buFont typeface="+mj-lt"/>
-              <a:buAutoNum type="arabicPeriod"/>
-            </a:pPr>
-            <a:r>
-              <a:rPr lang="en-AU" sz="1800" dirty="0" smtClean="0"/>
-              <a:t>Element</a:t>
-            </a:r>
-          </a:p>
-          <a:p>
-            <a:pPr marL="1771650" lvl="3" indent="-457200"/>
-            <a:r>
-              <a:rPr lang="en-AU" sz="1800" dirty="0" smtClean="0">
-                <a:latin typeface="Arial" charset="0"/>
-                <a:ea typeface="Arial" charset="0"/>
-                <a:cs typeface="Arial" charset="0"/>
-              </a:rPr>
-              <a:t>Widget </a:t>
-            </a:r>
-            <a:r>
-              <a:rPr lang="en-AU" sz="1800" dirty="0">
-                <a:latin typeface="Arial" charset="0"/>
-                <a:ea typeface="Arial" charset="0"/>
-                <a:cs typeface="Arial" charset="0"/>
-              </a:rPr>
-              <a:t>functions</a:t>
-            </a:r>
-          </a:p>
-          <a:p>
-            <a:pPr marL="1771650" lvl="3" indent="-457200"/>
-            <a:r>
-              <a:rPr lang="en-AU" sz="1800" dirty="0">
-                <a:latin typeface="Arial" charset="0"/>
-                <a:ea typeface="Arial" charset="0"/>
-                <a:cs typeface="Arial" charset="0"/>
-              </a:rPr>
-              <a:t>Reactive output functions</a:t>
-            </a:r>
-          </a:p>
-          <a:p>
-            <a:pPr marL="1771650" lvl="3" indent="-457200"/>
-            <a:r>
-              <a:rPr lang="en-AU" sz="1800" dirty="0" smtClean="0">
-                <a:latin typeface="Arial" charset="0"/>
-                <a:ea typeface="Arial" charset="0"/>
-                <a:cs typeface="Arial" charset="0"/>
-              </a:rPr>
-              <a:t>Headings, line breaks, images</a:t>
-            </a:r>
-            <a:endParaRPr lang="en-AU" sz="1800" dirty="0">
-              <a:latin typeface="Arial" charset="0"/>
-              <a:ea typeface="Arial" charset="0"/>
-              <a:cs typeface="Arial" charset="0"/>
-            </a:endParaRPr>
-          </a:p>
-          <a:p>
-            <a:pPr marL="514350" indent="-457200">
+            </a:pPr>
+            <a:r>
+              <a:rPr lang="en-AU" sz="2000" dirty="0"/>
+              <a:t>Examples:</a:t>
+            </a:r>
+          </a:p>
+          <a:p>
+            <a:pPr lvl="1">
               <a:lnSpc>
                 <a:spcPct val="100000"/>
               </a:lnSpc>
             </a:pPr>
             <a:r>
-              <a:rPr lang="en-AU" sz="2000" dirty="0"/>
-              <a:t>Functions of the same level are written as a string within their superior function, separated by “,”</a:t>
+              <a:rPr lang="en-AU" sz="1800" dirty="0"/>
+              <a:t>Sliders</a:t>
+            </a:r>
+          </a:p>
+          <a:p>
+            <a:pPr lvl="1">
+              <a:lnSpc>
+                <a:spcPct val="100000"/>
+              </a:lnSpc>
+            </a:pPr>
+            <a:r>
+              <a:rPr lang="en-AU" sz="1800" dirty="0" smtClean="0"/>
+              <a:t>Selection boxes</a:t>
+            </a:r>
+            <a:endParaRPr lang="en-AU" sz="1800" dirty="0"/>
+          </a:p>
+          <a:p>
+            <a:pPr lvl="1">
+              <a:lnSpc>
+                <a:spcPct val="100000"/>
+              </a:lnSpc>
+            </a:pPr>
+            <a:r>
+              <a:rPr lang="en-AU" sz="1800" dirty="0"/>
+              <a:t>Checkboxes</a:t>
+            </a:r>
+          </a:p>
+          <a:p>
+            <a:pPr lvl="1">
+              <a:lnSpc>
+                <a:spcPct val="100000"/>
+              </a:lnSpc>
+            </a:pPr>
+            <a:r>
+              <a:rPr lang="en-AU" sz="1800" dirty="0" smtClean="0"/>
+              <a:t>Radio buttons</a:t>
+            </a:r>
+            <a:endParaRPr lang="en-AU" sz="1800" dirty="0"/>
+          </a:p>
+          <a:p>
+            <a:pPr lvl="1">
+              <a:lnSpc>
+                <a:spcPct val="100000"/>
+              </a:lnSpc>
+            </a:pPr>
+            <a:r>
+              <a:rPr lang="en-AU" sz="1800" dirty="0"/>
+              <a:t>Download button</a:t>
             </a:r>
           </a:p>
         </p:txBody>
@@ -13572,8 +14058,8 @@
           <a:lstStyle/>
           <a:p>
             <a:pPr algn="ctr"/>
-            <a:fld id="{EB74E232-56C2-5245-A9FE-F251D8AD8F4F}" type="slidenum">
-              <a:rPr lang="en-US">
+            <a:fld id="{D8C7998C-D651-9840-B59D-E6ADC2A5D0B2}" type="slidenum">
+              <a:rPr lang="en-US" smtClean="0">
                 <a:solidFill>
                   <a:schemeClr val="bg1"/>
                 </a:solidFill>
@@ -13597,14 +14083,21 @@
     </p:spTree>
     <p:extLst>
       <p:ext uri="{BB962C8B-B14F-4D97-AF65-F5344CB8AC3E}">
-        <p14:creationId xmlns:p14="http://schemas.microsoft.com/office/powerpoint/2010/main" val="1068838038"/>
+        <p14:creationId xmlns:p14="http://schemas.microsoft.com/office/powerpoint/2010/main" val="1368475069"/>
       </p:ext>
     </p:extLst>
   </p:cSld>
   <p:clrMapOvr>
     <a:masterClrMapping/>
   </p:clrMapOvr>
-  <p:transition/>
+  <mc:AlternateContent xmlns:mc="http://schemas.openxmlformats.org/markup-compatibility/2006">
+    <mc:Choice xmlns:p14="http://schemas.microsoft.com/office/powerpoint/2010/main" Requires="p14">
+      <p:transition spd="slow" p14:dur="2000"/>
+    </mc:Choice>
+    <mc:Fallback>
+      <p:transition spd="slow"/>
+    </mc:Fallback>
+  </mc:AlternateContent>
   <p:timing>
     <p:tnLst>
       <p:par>
@@ -13650,159 +14143,10 @@
           <a:lstStyle/>
           <a:p>
             <a:r>
-              <a:rPr lang="en-US" dirty="0" smtClean="0"/>
-              <a:t>ui.R: Shiny Widgets</a:t>
-            </a:r>
-            <a:endParaRPr lang="en-US" dirty="0"/>
-          </a:p>
-        </p:txBody>
-      </p:sp>
-      <p:sp>
-        <p:nvSpPr>
-          <p:cNvPr id="3" name="Text Placeholder 2"/>
-          <p:cNvSpPr>
-            <a:spLocks noGrp="1"/>
-          </p:cNvSpPr>
-          <p:nvPr>
-            <p:ph type="body" sz="quarter" idx="11"/>
-          </p:nvPr>
-        </p:nvSpPr>
-        <p:spPr/>
-        <p:txBody>
-          <a:bodyPr>
-            <a:noAutofit/>
-          </a:bodyPr>
-          <a:lstStyle/>
-          <a:p>
-            <a:pPr>
-              <a:lnSpc>
-                <a:spcPct val="100000"/>
-              </a:lnSpc>
-            </a:pPr>
-            <a:r>
-              <a:rPr lang="en-AU" sz="2000" dirty="0"/>
-              <a:t>Interactive elements</a:t>
-            </a:r>
-          </a:p>
-          <a:p>
-            <a:pPr>
-              <a:lnSpc>
-                <a:spcPct val="100000"/>
-              </a:lnSpc>
-            </a:pPr>
-            <a:r>
-              <a:rPr lang="en-AU" sz="2000" dirty="0"/>
-              <a:t>Allow users to explore different values or categories of parameters or variables</a:t>
-            </a:r>
-          </a:p>
-          <a:p>
-            <a:pPr>
-              <a:lnSpc>
-                <a:spcPct val="100000"/>
-              </a:lnSpc>
-            </a:pPr>
-            <a:r>
-              <a:rPr lang="en-AU" sz="2000" dirty="0"/>
-              <a:t>Store values chosen by the user</a:t>
-            </a:r>
-          </a:p>
-          <a:p>
-            <a:pPr lvl="1">
-              <a:lnSpc>
-                <a:spcPct val="100000"/>
-              </a:lnSpc>
-            </a:pPr>
-            <a:r>
-              <a:rPr lang="en-AU" sz="1800" dirty="0"/>
-              <a:t>That are involved in a cascade of functions in </a:t>
-            </a:r>
-            <a:r>
-              <a:rPr lang="en-AU" sz="1800" dirty="0" err="1"/>
-              <a:t>server.R</a:t>
-            </a:r>
-            <a:r>
-              <a:rPr lang="en-AU" sz="1800" dirty="0"/>
-              <a:t> to produce the displayed output</a:t>
-            </a:r>
-          </a:p>
-          <a:p>
-            <a:pPr>
-              <a:lnSpc>
-                <a:spcPct val="100000"/>
-              </a:lnSpc>
-            </a:pPr>
-            <a:r>
-              <a:rPr lang="en-AU" sz="2000" dirty="0"/>
-              <a:t>Changing a widget, changes the resulting output object</a:t>
-            </a:r>
-          </a:p>
-          <a:p>
-            <a:pPr>
-              <a:lnSpc>
-                <a:spcPct val="100000"/>
-              </a:lnSpc>
-            </a:pPr>
-            <a:r>
-              <a:rPr lang="en-AU" sz="2000" dirty="0"/>
-              <a:t>Examples:</a:t>
-            </a:r>
-          </a:p>
-          <a:p>
-            <a:pPr lvl="1">
-              <a:lnSpc>
-                <a:spcPct val="100000"/>
-              </a:lnSpc>
-            </a:pPr>
-            <a:r>
-              <a:rPr lang="en-AU" sz="1800" dirty="0"/>
-              <a:t>Sliders</a:t>
-            </a:r>
-          </a:p>
-          <a:p>
-            <a:pPr lvl="1">
-              <a:lnSpc>
-                <a:spcPct val="100000"/>
-              </a:lnSpc>
-            </a:pPr>
-            <a:r>
-              <a:rPr lang="en-AU" sz="1800" dirty="0" smtClean="0"/>
-              <a:t>Selection boxes</a:t>
-            </a:r>
-            <a:endParaRPr lang="en-AU" sz="1800" dirty="0"/>
-          </a:p>
-          <a:p>
-            <a:pPr lvl="1">
-              <a:lnSpc>
-                <a:spcPct val="100000"/>
-              </a:lnSpc>
-            </a:pPr>
-            <a:r>
-              <a:rPr lang="en-AU" sz="1800" dirty="0"/>
-              <a:t>Checkboxes</a:t>
-            </a:r>
-          </a:p>
-          <a:p>
-            <a:pPr lvl="1">
-              <a:lnSpc>
-                <a:spcPct val="100000"/>
-              </a:lnSpc>
-            </a:pPr>
-            <a:r>
-              <a:rPr lang="en-AU" sz="1800" dirty="0" smtClean="0"/>
-              <a:t>Radio buttons</a:t>
-            </a:r>
-            <a:endParaRPr lang="en-AU" sz="1800" dirty="0"/>
-          </a:p>
-          <a:p>
-            <a:pPr lvl="1">
-              <a:lnSpc>
-                <a:spcPct val="100000"/>
-              </a:lnSpc>
-            </a:pPr>
-            <a:r>
-              <a:rPr lang="en-AU" sz="1800" dirty="0"/>
-              <a:t>Download button</a:t>
-            </a:r>
+              <a:rPr lang="en-AU" dirty="0" smtClean="0"/>
+              <a:t>ui.R: Displaying Reactive Output</a:t>
+            </a:r>
+            <a:endParaRPr lang="en-AU" dirty="0"/>
           </a:p>
         </p:txBody>
       </p:sp>
@@ -13829,8 +14173,8 @@
           <a:lstStyle/>
           <a:p>
             <a:pPr algn="ctr"/>
-            <a:fld id="{D8C7998C-D651-9840-B59D-E6ADC2A5D0B2}" type="slidenum">
-              <a:rPr lang="en-US" smtClean="0">
+            <a:fld id="{A1ADA812-6D85-F54A-9708-1AEB03570AF0}" type="slidenum">
+              <a:rPr lang="en-US">
                 <a:solidFill>
                   <a:schemeClr val="bg1"/>
                 </a:solidFill>
@@ -13851,17 +14195,178 @@
           </a:p>
         </p:txBody>
       </p:sp>
+      <p:sp>
+        <p:nvSpPr>
+          <p:cNvPr id="3" name="Text Placeholder 2"/>
+          <p:cNvSpPr>
+            <a:spLocks noGrp="1"/>
+          </p:cNvSpPr>
+          <p:nvPr>
+            <p:ph type="body" sz="quarter" idx="11"/>
+          </p:nvPr>
+        </p:nvSpPr>
+        <p:spPr/>
+        <p:txBody>
+          <a:bodyPr/>
+          <a:lstStyle/>
+          <a:p>
+            <a:pPr>
+              <a:lnSpc>
+                <a:spcPct val="100000"/>
+              </a:lnSpc>
+            </a:pPr>
+            <a:r>
+              <a:rPr lang="en-AU" sz="2000" dirty="0"/>
+              <a:t>Output functions call R objects in </a:t>
+            </a:r>
+            <a:r>
+              <a:rPr lang="en-AU" sz="2000" dirty="0" err="1"/>
+              <a:t>server.R</a:t>
+            </a:r>
+            <a:r>
+              <a:rPr lang="en-AU" sz="2000" dirty="0"/>
+              <a:t> to the UI</a:t>
+            </a:r>
+          </a:p>
+          <a:p>
+            <a:pPr>
+              <a:lnSpc>
+                <a:spcPct val="100000"/>
+              </a:lnSpc>
+            </a:pPr>
+            <a:r>
+              <a:rPr lang="en-AU" sz="2000" dirty="0"/>
+              <a:t>Examples:</a:t>
+            </a:r>
+          </a:p>
+          <a:p>
+            <a:pPr lvl="1">
+              <a:lnSpc>
+                <a:spcPct val="100000"/>
+              </a:lnSpc>
+            </a:pPr>
+            <a:r>
+              <a:rPr lang="en-AU" sz="1800" dirty="0" err="1">
+                <a:latin typeface="Monaco" charset="0"/>
+                <a:ea typeface="Monaco" charset="0"/>
+                <a:cs typeface="Monaco" charset="0"/>
+              </a:rPr>
+              <a:t>plotOutput</a:t>
+            </a:r>
+            <a:endParaRPr lang="en-AU" sz="1800" dirty="0">
+              <a:latin typeface="Monaco" charset="0"/>
+              <a:ea typeface="Monaco" charset="0"/>
+              <a:cs typeface="Monaco" charset="0"/>
+            </a:endParaRPr>
+          </a:p>
+          <a:p>
+            <a:pPr lvl="1">
+              <a:lnSpc>
+                <a:spcPct val="100000"/>
+              </a:lnSpc>
+            </a:pPr>
+            <a:r>
+              <a:rPr lang="en-AU" sz="1800" dirty="0" err="1">
+                <a:latin typeface="Monaco" charset="0"/>
+                <a:ea typeface="Monaco" charset="0"/>
+                <a:cs typeface="Monaco" charset="0"/>
+              </a:rPr>
+              <a:t>tableOutput</a:t>
+            </a:r>
+            <a:endParaRPr lang="en-AU" sz="1800" dirty="0">
+              <a:latin typeface="Monaco" charset="0"/>
+              <a:ea typeface="Monaco" charset="0"/>
+              <a:cs typeface="Monaco" charset="0"/>
+            </a:endParaRPr>
+          </a:p>
+          <a:p>
+            <a:pPr lvl="1">
+              <a:lnSpc>
+                <a:spcPct val="100000"/>
+              </a:lnSpc>
+            </a:pPr>
+            <a:r>
+              <a:rPr lang="en-AU" sz="1800" dirty="0" err="1">
+                <a:latin typeface="Monaco" charset="0"/>
+                <a:ea typeface="Monaco" charset="0"/>
+                <a:cs typeface="Monaco" charset="0"/>
+              </a:rPr>
+              <a:t>textOutput</a:t>
+            </a:r>
+            <a:endParaRPr lang="en-AU" sz="1800" dirty="0">
+              <a:latin typeface="Monaco" charset="0"/>
+              <a:ea typeface="Monaco" charset="0"/>
+              <a:cs typeface="Monaco" charset="0"/>
+            </a:endParaRPr>
+          </a:p>
+          <a:p>
+            <a:pPr>
+              <a:lnSpc>
+                <a:spcPct val="100000"/>
+              </a:lnSpc>
+            </a:pPr>
+            <a:r>
+              <a:rPr lang="en-AU" sz="2000" dirty="0">
+                <a:cs typeface="Courier New" panose="02070309020205020404" pitchFamily="49" charset="0"/>
+              </a:rPr>
+              <a:t>Specific for the object in </a:t>
+            </a:r>
+            <a:r>
+              <a:rPr lang="en-AU" sz="2000" dirty="0" err="1">
+                <a:cs typeface="Courier New" panose="02070309020205020404" pitchFamily="49" charset="0"/>
+              </a:rPr>
+              <a:t>server.R</a:t>
+            </a:r>
+            <a:endParaRPr lang="en-AU" sz="2000" dirty="0">
+              <a:cs typeface="Courier New" panose="02070309020205020404" pitchFamily="49" charset="0"/>
+            </a:endParaRPr>
+          </a:p>
+          <a:p>
+            <a:pPr lvl="1">
+              <a:lnSpc>
+                <a:spcPct val="100000"/>
+              </a:lnSpc>
+            </a:pPr>
+            <a:r>
+              <a:rPr lang="en-AU" sz="1800" dirty="0">
+                <a:cs typeface="Courier New" panose="02070309020205020404" pitchFamily="49" charset="0"/>
+              </a:rPr>
+              <a:t>i.e. ggplot2 object called by </a:t>
+            </a:r>
+            <a:r>
+              <a:rPr lang="en-AU" sz="1800" dirty="0" err="1" smtClean="0">
+                <a:latin typeface="Monaco" charset="0"/>
+                <a:ea typeface="Monaco" charset="0"/>
+                <a:cs typeface="Monaco" charset="0"/>
+              </a:rPr>
+              <a:t>plotOutput</a:t>
+            </a:r>
+            <a:endParaRPr lang="en-AU" sz="1800" dirty="0">
+              <a:latin typeface="Monaco" charset="0"/>
+              <a:ea typeface="Monaco" charset="0"/>
+              <a:cs typeface="Monaco" charset="0"/>
+            </a:endParaRPr>
+          </a:p>
+        </p:txBody>
+      </p:sp>
     </p:spTree>
     <p:extLst>
       <p:ext uri="{BB962C8B-B14F-4D97-AF65-F5344CB8AC3E}">
-        <p14:creationId xmlns:p14="http://schemas.microsoft.com/office/powerpoint/2010/main" val="1368475069"/>
+        <p14:creationId xmlns:p14="http://schemas.microsoft.com/office/powerpoint/2010/main" val="330329931"/>
       </p:ext>
     </p:extLst>
   </p:cSld>
   <p:clrMapOvr>
     <a:masterClrMapping/>
   </p:clrMapOvr>
-  <p:transition/>
+  <mc:AlternateContent xmlns:mc="http://schemas.openxmlformats.org/markup-compatibility/2006">
+    <mc:Choice xmlns:p14="http://schemas.microsoft.com/office/powerpoint/2010/main" Requires="p14">
+      <p:transition spd="slow" p14:dur="2000"/>
+    </mc:Choice>
+    <mc:Fallback>
+      <p:transition spd="slow"/>
+    </mc:Fallback>
+  </mc:AlternateContent>
   <p:timing>
     <p:tnLst>
       <p:par>

</xml_diff>